<commit_message>
add more regression models and chart
</commit_message>
<xml_diff>
--- a/Non-R/Internal slidedeck.pptx
+++ b/Non-R/Internal slidedeck.pptx
@@ -2496,7 +2496,7 @@
                   <a:bodyPr/>
                   <a:lstStyle/>
                   <a:p>
-                    <a:fld id="{5E418309-1BE7-4E70-9D72-F7BC384CD8A5}" type="CELLRANGE">
+                    <a:fld id="{4845A5F9-0168-496E-9533-F099D97B3F0A}" type="CELLRANGE">
                       <a:rPr lang="en-US"/>
                       <a:pPr/>
                       <a:t>[CELLRANGE]</a:t>
@@ -2538,7 +2538,7 @@
                   <a:bodyPr/>
                   <a:lstStyle/>
                   <a:p>
-                    <a:fld id="{02EB3A96-3F54-49CB-8173-2004CC1AB99A}" type="CELLRANGE">
+                    <a:fld id="{7C0D4C19-3AFE-4728-9129-1B1142F224C7}" type="CELLRANGE">
                       <a:rPr lang="en-GB"/>
                       <a:pPr/>
                       <a:t>[CELLRANGE]</a:t>
@@ -2730,7 +2730,7 @@
                   <a:bodyPr/>
                   <a:lstStyle/>
                   <a:p>
-                    <a:fld id="{38E3F4D9-A807-4D7A-A88E-1BB9C0225D2B}" type="CELLRANGE">
+                    <a:fld id="{FFACE679-B977-48D0-8407-8A4316D35814}" type="CELLRANGE">
                       <a:rPr lang="en-US"/>
                       <a:pPr/>
                       <a:t>[CELLRANGE]</a:t>
@@ -2762,7 +2762,7 @@
                   <a:bodyPr/>
                   <a:lstStyle/>
                   <a:p>
-                    <a:fld id="{A00E775F-9E08-4619-ADB6-6F1EFF45A823}" type="CELLRANGE">
+                    <a:fld id="{52C9C9DF-63EC-4E1F-AE2C-89FE32284B68}" type="CELLRANGE">
                       <a:rPr lang="en-GB"/>
                       <a:pPr/>
                       <a:t>[CELLRANGE]</a:t>
@@ -2795,7 +2795,7 @@
                   <a:bodyPr/>
                   <a:lstStyle/>
                   <a:p>
-                    <a:fld id="{AD34C256-BB0B-4D9C-929B-6E9DBE428825}" type="CELLRANGE">
+                    <a:fld id="{30777EC8-8ECD-479B-9325-9A9416DB3D04}" type="CELLRANGE">
                       <a:rPr lang="en-GB"/>
                       <a:pPr/>
                       <a:t>[CELLRANGE]</a:t>
@@ -2828,7 +2828,7 @@
                   <a:bodyPr/>
                   <a:lstStyle/>
                   <a:p>
-                    <a:fld id="{400A5CCC-EA63-4F73-BEF6-622CD52BFA3D}" type="CELLRANGE">
+                    <a:fld id="{5C193C29-238F-4B53-8138-7BEF06D8EACD}" type="CELLRANGE">
                       <a:rPr lang="en-GB"/>
                       <a:pPr/>
                       <a:t>[CELLRANGE]</a:t>
@@ -3017,7 +3017,7 @@
                   <a:bodyPr/>
                   <a:lstStyle/>
                   <a:p>
-                    <a:fld id="{62BC06F1-1EFD-49F4-8BCA-2413EC2923A9}" type="CELLRANGE">
+                    <a:fld id="{00A380CA-CB8E-4B9F-A5E5-47EB51FCE1E5}" type="CELLRANGE">
                       <a:rPr lang="en-US"/>
                       <a:pPr/>
                       <a:t>[CELLRANGE]</a:t>
@@ -3049,7 +3049,7 @@
                   <a:bodyPr/>
                   <a:lstStyle/>
                   <a:p>
-                    <a:fld id="{63B24AB0-71B4-4399-A4EA-7DF08E1B6B64}" type="CELLRANGE">
+                    <a:fld id="{99A2BF98-34D0-4EA4-B154-371323E94E85}" type="CELLRANGE">
                       <a:rPr lang="en-GB"/>
                       <a:pPr/>
                       <a:t>[CELLRANGE]</a:t>
@@ -3082,7 +3082,7 @@
                   <a:bodyPr/>
                   <a:lstStyle/>
                   <a:p>
-                    <a:fld id="{E73533B9-ED06-4D4F-9248-AF66C6915D6A}" type="CELLRANGE">
+                    <a:fld id="{39B6B7FC-527D-4B39-8B3D-3A8F3D658549}" type="CELLRANGE">
                       <a:rPr lang="en-GB"/>
                       <a:pPr/>
                       <a:t>[CELLRANGE]</a:t>
@@ -3115,7 +3115,7 @@
                   <a:bodyPr/>
                   <a:lstStyle/>
                   <a:p>
-                    <a:fld id="{88D61D56-FC07-4588-85F0-6793F66EE277}" type="CELLRANGE">
+                    <a:fld id="{F2F22E85-8B86-4CEA-A1BD-8DC427F50287}" type="CELLRANGE">
                       <a:rPr lang="en-GB"/>
                       <a:pPr/>
                       <a:t>[CELLRANGE]</a:t>
@@ -3304,7 +3304,7 @@
                   <a:bodyPr/>
                   <a:lstStyle/>
                   <a:p>
-                    <a:fld id="{94657930-4F44-48EC-852E-D2C0B68BED8F}" type="CELLRANGE">
+                    <a:fld id="{D89A484D-1613-4EEF-85C4-C7D0D1B53587}" type="CELLRANGE">
                       <a:rPr lang="en-US"/>
                       <a:pPr/>
                       <a:t>[CELLRANGE]</a:t>
@@ -3336,7 +3336,7 @@
                   <a:bodyPr/>
                   <a:lstStyle/>
                   <a:p>
-                    <a:fld id="{1A050C18-D777-4552-8E7B-8C47C6E495D0}" type="CELLRANGE">
+                    <a:fld id="{D541E7FE-DBF8-4AB2-A2A0-0DF22987E2BD}" type="CELLRANGE">
                       <a:rPr lang="en-GB"/>
                       <a:pPr/>
                       <a:t>[CELLRANGE]</a:t>
@@ -3369,7 +3369,7 @@
                   <a:bodyPr/>
                   <a:lstStyle/>
                   <a:p>
-                    <a:fld id="{1DFF7D37-8CE1-40C2-A2C8-0883D1793D05}" type="CELLRANGE">
+                    <a:fld id="{AD80323C-B3F5-4655-93F0-F2AED5D8FC5B}" type="CELLRANGE">
                       <a:rPr lang="en-GB"/>
                       <a:pPr/>
                       <a:t>[CELLRANGE]</a:t>
@@ -3402,7 +3402,7 @@
                   <a:bodyPr/>
                   <a:lstStyle/>
                   <a:p>
-                    <a:fld id="{DA0FA2F3-D164-4DD4-B232-0BE3F5E910C8}" type="CELLRANGE">
+                    <a:fld id="{A15554E5-15AC-4B31-AF4B-6246A1EC8E10}" type="CELLRANGE">
                       <a:rPr lang="en-GB"/>
                       <a:pPr/>
                       <a:t>[CELLRANGE]</a:t>
@@ -3591,7 +3591,7 @@
                   <a:bodyPr/>
                   <a:lstStyle/>
                   <a:p>
-                    <a:fld id="{D2AD38F6-877E-4808-8CDC-DF0F500742A6}" type="CELLRANGE">
+                    <a:fld id="{695E9E8A-4C6B-4DB8-B626-77986D31A0AF}" type="CELLRANGE">
                       <a:rPr lang="en-US"/>
                       <a:pPr/>
                       <a:t>[CELLRANGE]</a:t>
@@ -3623,7 +3623,7 @@
                   <a:bodyPr/>
                   <a:lstStyle/>
                   <a:p>
-                    <a:fld id="{76B15ABD-6C4D-4AC6-95B6-549AA5A467B7}" type="CELLRANGE">
+                    <a:fld id="{DDCD2434-8C15-4953-9EB9-4766C8500734}" type="CELLRANGE">
                       <a:rPr lang="en-GB"/>
                       <a:pPr/>
                       <a:t>[CELLRANGE]</a:t>
@@ -3656,7 +3656,7 @@
                   <a:bodyPr/>
                   <a:lstStyle/>
                   <a:p>
-                    <a:fld id="{A220D22F-C7ED-420F-8C69-BBD4AAD129C3}" type="CELLRANGE">
+                    <a:fld id="{9AB2BAF5-6B4C-4CAE-A2D9-4D4BB76A8DB8}" type="CELLRANGE">
                       <a:rPr lang="en-GB"/>
                       <a:pPr/>
                       <a:t>[CELLRANGE]</a:t>
@@ -3689,7 +3689,7 @@
                   <a:bodyPr/>
                   <a:lstStyle/>
                   <a:p>
-                    <a:fld id="{0B109EB3-0C38-4FE9-B9BB-DA3B366AC31E}" type="CELLRANGE">
+                    <a:fld id="{25E86E4A-9E03-42D8-8314-203888D3EFA1}" type="CELLRANGE">
                       <a:rPr lang="en-GB"/>
                       <a:pPr/>
                       <a:t>[CELLRANGE]</a:t>
@@ -6930,7 +6930,7 @@
           <a:p>
             <a:fld id="{7EE13E36-9F1A-48BF-8B08-3FA708884CC2}" type="datetimeFigureOut">
               <a:rPr lang="en-GB" smtClean="0"/>
-              <a:t>22/03/2023</a:t>
+              <a:t>24/03/2023</a:t>
             </a:fld>
             <a:endParaRPr lang="en-GB"/>
           </a:p>
@@ -7244,7 +7244,7 @@
           <a:p>
             <a:r>
               <a:rPr lang="en-GB" dirty="0"/>
-              <a:t>Overall, parental employment rates are above non-parents for almost all groups (notably not women). This is probably due to age composition, with working age people more likely to be parents.</a:t>
+              <a:t>LPEG</a:t>
             </a:r>
           </a:p>
         </p:txBody>
@@ -7266,7 +7266,7 @@
           <a:p>
             <a:fld id="{AB494F1A-23BD-4085-BE21-19A50FF7AFFF}" type="slidenum">
               <a:rPr lang="en-GB" smtClean="0"/>
-              <a:t>3</a:t>
+              <a:t>1</a:t>
             </a:fld>
             <a:endParaRPr lang="en-GB"/>
           </a:p>
@@ -7275,7 +7275,7 @@
     </p:spTree>
     <p:extLst>
       <p:ext uri="{BB962C8B-B14F-4D97-AF65-F5344CB8AC3E}">
-        <p14:creationId xmlns:p14="http://schemas.microsoft.com/office/powerpoint/2010/main" val="4155034357"/>
+        <p14:creationId xmlns:p14="http://schemas.microsoft.com/office/powerpoint/2010/main" val="146556215"/>
       </p:ext>
     </p:extLst>
   </p:cSld>
@@ -7331,7 +7331,7 @@
           <a:p>
             <a:r>
               <a:rPr lang="en-GB" dirty="0"/>
-              <a:t>The shares are pretty much for the UK overall too – i.e. that the prop of parents who are 18-64 is ~100% while it is 95% for non-parents</a:t>
+              <a:t>Overall, parental employment rates are above non-parents for almost all groups (notably not women). This is probably due to age composition, with working age people more likely to be parents.</a:t>
             </a:r>
           </a:p>
         </p:txBody>
@@ -7353,7 +7353,7 @@
           <a:p>
             <a:fld id="{AB494F1A-23BD-4085-BE21-19A50FF7AFFF}" type="slidenum">
               <a:rPr lang="en-GB" smtClean="0"/>
-              <a:t>4</a:t>
+              <a:t>3</a:t>
             </a:fld>
             <a:endParaRPr lang="en-GB"/>
           </a:p>
@@ -7362,7 +7362,7 @@
     </p:spTree>
     <p:extLst>
       <p:ext uri="{BB962C8B-B14F-4D97-AF65-F5344CB8AC3E}">
-        <p14:creationId xmlns:p14="http://schemas.microsoft.com/office/powerpoint/2010/main" val="1478279281"/>
+        <p14:creationId xmlns:p14="http://schemas.microsoft.com/office/powerpoint/2010/main" val="4155034357"/>
       </p:ext>
     </p:extLst>
   </p:cSld>
@@ -7416,7 +7416,10 @@
           <a:bodyPr/>
           <a:lstStyle/>
           <a:p>
-            <a:endParaRPr lang="en-GB" dirty="0"/>
+            <a:r>
+              <a:rPr lang="en-GB" dirty="0"/>
+              <a:t>The shares are pretty much for the UK overall too – i.e. that the prop of parents who are 18-64 is ~100% while it is 95% for non-parents</a:t>
+            </a:r>
           </a:p>
         </p:txBody>
       </p:sp>
@@ -7437,7 +7440,7 @@
           <a:p>
             <a:fld id="{AB494F1A-23BD-4085-BE21-19A50FF7AFFF}" type="slidenum">
               <a:rPr lang="en-GB" smtClean="0"/>
-              <a:t>5</a:t>
+              <a:t>4</a:t>
             </a:fld>
             <a:endParaRPr lang="en-GB"/>
           </a:p>
@@ -7446,7 +7449,7 @@
     </p:spTree>
     <p:extLst>
       <p:ext uri="{BB962C8B-B14F-4D97-AF65-F5344CB8AC3E}">
-        <p14:creationId xmlns:p14="http://schemas.microsoft.com/office/powerpoint/2010/main" val="1872900177"/>
+        <p14:creationId xmlns:p14="http://schemas.microsoft.com/office/powerpoint/2010/main" val="1478279281"/>
       </p:ext>
     </p:extLst>
   </p:cSld>
@@ -7500,9 +7503,93 @@
           <a:bodyPr/>
           <a:lstStyle/>
           <a:p>
+            <a:endParaRPr lang="en-GB" dirty="0"/>
+          </a:p>
+        </p:txBody>
+      </p:sp>
+      <p:sp>
+        <p:nvSpPr>
+          <p:cNvPr id="4" name="Slide Number Placeholder 3"/>
+          <p:cNvSpPr>
+            <a:spLocks noGrp="1"/>
+          </p:cNvSpPr>
+          <p:nvPr>
+            <p:ph type="sldNum" sz="quarter" idx="5"/>
+          </p:nvPr>
+        </p:nvSpPr>
+        <p:spPr/>
+        <p:txBody>
+          <a:bodyPr/>
+          <a:lstStyle/>
+          <a:p>
+            <a:fld id="{AB494F1A-23BD-4085-BE21-19A50FF7AFFF}" type="slidenum">
+              <a:rPr lang="en-GB" smtClean="0"/>
+              <a:t>5</a:t>
+            </a:fld>
+            <a:endParaRPr lang="en-GB"/>
+          </a:p>
+        </p:txBody>
+      </p:sp>
+    </p:spTree>
+    <p:extLst>
+      <p:ext uri="{BB962C8B-B14F-4D97-AF65-F5344CB8AC3E}">
+        <p14:creationId xmlns:p14="http://schemas.microsoft.com/office/powerpoint/2010/main" val="1872900177"/>
+      </p:ext>
+    </p:extLst>
+  </p:cSld>
+  <p:clrMapOvr>
+    <a:masterClrMapping/>
+  </p:clrMapOvr>
+</p:notes>
+</file>
+
+<file path=ppt/notesSlides/notesSlide5.xml><?xml version="1.0" encoding="utf-8"?>
+<p:notes xmlns:a="http://schemas.openxmlformats.org/drawingml/2006/main" xmlns:r="http://schemas.openxmlformats.org/officeDocument/2006/relationships" xmlns:p="http://schemas.openxmlformats.org/presentationml/2006/main">
+  <p:cSld>
+    <p:spTree>
+      <p:nvGrpSpPr>
+        <p:cNvPr id="1" name=""/>
+        <p:cNvGrpSpPr/>
+        <p:nvPr/>
+      </p:nvGrpSpPr>
+      <p:grpSpPr>
+        <a:xfrm>
+          <a:off x="0" y="0"/>
+          <a:ext cx="0" cy="0"/>
+          <a:chOff x="0" y="0"/>
+          <a:chExt cx="0" cy="0"/>
+        </a:xfrm>
+      </p:grpSpPr>
+      <p:sp>
+        <p:nvSpPr>
+          <p:cNvPr id="2" name="Slide Image Placeholder 1"/>
+          <p:cNvSpPr>
+            <a:spLocks noGrp="1" noRot="1" noChangeAspect="1"/>
+          </p:cNvSpPr>
+          <p:nvPr>
+            <p:ph type="sldImg"/>
+          </p:nvPr>
+        </p:nvSpPr>
+        <p:spPr/>
+      </p:sp>
+      <p:sp>
+        <p:nvSpPr>
+          <p:cNvPr id="3" name="Notes Placeholder 2"/>
+          <p:cNvSpPr>
+            <a:spLocks noGrp="1"/>
+          </p:cNvSpPr>
+          <p:nvPr>
+            <p:ph type="body" idx="1"/>
+          </p:nvPr>
+        </p:nvSpPr>
+        <p:spPr/>
+        <p:txBody>
+          <a:bodyPr/>
+          <a:lstStyle/>
+          <a:p>
             <a:r>
               <a:rPr lang="en-GB" dirty="0"/>
-              <a:t>London has more mothers in 35-49 age range, and since London has a lot of students, there is a lower share of 25-34 aged ones.</a:t>
+              <a:t>London has more mothers in 35-49 age range, and since London has a lot of students, there is a lower share of 25-34 aged ones. So age does not explain this one</a:t>
             </a:r>
           </a:p>
         </p:txBody>
@@ -13312,12 +13399,14 @@
         </p:nvSpPr>
         <p:spPr/>
         <p:txBody>
-          <a:bodyPr/>
+          <a:bodyPr>
+            <a:normAutofit/>
+          </a:bodyPr>
           <a:lstStyle/>
           <a:p>
             <a:r>
               <a:rPr lang="en-GB" dirty="0"/>
-              <a:t>Parental employment</a:t>
+              <a:t>London’s puzzling employment gap</a:t>
             </a:r>
           </a:p>
         </p:txBody>
@@ -13345,7 +13434,7 @@
           <a:p>
             <a:r>
               <a:rPr lang="en-GB" dirty="0"/>
-              <a:t>Why are women in London less likely to work when they are parents?</a:t>
+              <a:t>Why are women in London less likely to work when they are parents relative to UK peers?</a:t>
             </a:r>
           </a:p>
         </p:txBody>
@@ -13836,16 +13925,54 @@
           <a:bodyPr/>
           <a:lstStyle/>
           <a:p>
-            <a:endParaRPr lang="en-GB"/>
+            <a:r>
+              <a:rPr lang="en-GB" dirty="0"/>
+              <a:t>The gap remains stubborn when disentangling characteristics</a:t>
+            </a:r>
           </a:p>
         </p:txBody>
       </p:sp>
+      <p:pic>
+        <p:nvPicPr>
+          <p:cNvPr id="9" name="Content Placeholder 8" descr="Chart&#10;&#10;Description automatically generated">
+            <a:extLst>
+              <a:ext uri="{FF2B5EF4-FFF2-40B4-BE49-F238E27FC236}">
+                <a16:creationId xmlns:a16="http://schemas.microsoft.com/office/drawing/2014/main" id="{3A4C81B1-BA34-40E8-967F-6DB90BD0DD16}"/>
+              </a:ext>
+            </a:extLst>
+          </p:cNvPr>
+          <p:cNvPicPr>
+            <a:picLocks noGrp="1" noChangeAspect="1"/>
+          </p:cNvPicPr>
+          <p:nvPr>
+            <p:ph sz="half" idx="1"/>
+          </p:nvPr>
+        </p:nvPicPr>
+        <p:blipFill>
+          <a:blip r:embed="rId2">
+            <a:extLst>
+              <a:ext uri="{28A0092B-C50C-407E-A947-70E740481C1C}">
+                <a14:useLocalDpi xmlns:a14="http://schemas.microsoft.com/office/drawing/2010/main" val="0"/>
+              </a:ext>
+            </a:extLst>
+          </a:blip>
+          <a:stretch>
+            <a:fillRect/>
+          </a:stretch>
+        </p:blipFill>
+        <p:spPr>
+          <a:xfrm>
+            <a:off x="1253331" y="1825625"/>
+            <a:ext cx="4351338" cy="4351338"/>
+          </a:xfrm>
+        </p:spPr>
+      </p:pic>
       <p:sp>
         <p:nvSpPr>
-          <p:cNvPr id="3" name="Content Placeholder 2">
+          <p:cNvPr id="7" name="Content Placeholder 6">
             <a:extLst>
               <a:ext uri="{FF2B5EF4-FFF2-40B4-BE49-F238E27FC236}">
-                <a16:creationId xmlns:a16="http://schemas.microsoft.com/office/drawing/2014/main" id="{7FF0EDAF-782D-45D4-AF87-B6ABCBFD8F9A}"/>
+                <a16:creationId xmlns:a16="http://schemas.microsoft.com/office/drawing/2014/main" id="{CB3BC103-A57A-496F-871F-08D5FBC67906}"/>
               </a:ext>
             </a:extLst>
           </p:cNvPr>
@@ -13853,7 +13980,7 @@
             <a:spLocks noGrp="1"/>
           </p:cNvSpPr>
           <p:nvPr>
-            <p:ph idx="1"/>
+            <p:ph sz="half" idx="2"/>
           </p:nvPr>
         </p:nvSpPr>
         <p:spPr/>
@@ -13861,6 +13988,133 @@
           <a:bodyPr/>
           <a:lstStyle/>
           <a:p>
+            <a:r>
+              <a:rPr lang="en-GB" dirty="0"/>
+              <a:t>We regress employment on personal and family characteristics</a:t>
+            </a:r>
+          </a:p>
+          <a:p>
+            <a:r>
+              <a:rPr lang="en-GB" dirty="0"/>
+              <a:t>The estimate is relative to base case of model (see footnote)</a:t>
+            </a:r>
+          </a:p>
+          <a:p>
+            <a:r>
+              <a:rPr lang="en-GB" dirty="0"/>
+              <a:t>The female employment gap remains in all models except including work-limiting health issues</a:t>
+            </a:r>
+          </a:p>
+          <a:p>
+            <a:endParaRPr lang="en-GB" dirty="0"/>
+          </a:p>
+        </p:txBody>
+      </p:sp>
+      <p:sp>
+        <p:nvSpPr>
+          <p:cNvPr id="10" name="TextBox 9">
+            <a:extLst>
+              <a:ext uri="{FF2B5EF4-FFF2-40B4-BE49-F238E27FC236}">
+                <a16:creationId xmlns:a16="http://schemas.microsoft.com/office/drawing/2014/main" id="{DDDEC227-68C2-46AC-81A4-368F37020BAA}"/>
+              </a:ext>
+            </a:extLst>
+          </p:cNvPr>
+          <p:cNvSpPr txBox="1"/>
+          <p:nvPr/>
+        </p:nvSpPr>
+        <p:spPr>
+          <a:xfrm>
+            <a:off x="681487" y="6176963"/>
+            <a:ext cx="9057736" cy="738664"/>
+          </a:xfrm>
+          <a:prstGeom prst="rect">
+            <a:avLst/>
+          </a:prstGeom>
+          <a:noFill/>
+        </p:spPr>
+        <p:txBody>
+          <a:bodyPr wrap="square" rtlCol="0">
+            <a:spAutoFit/>
+          </a:bodyPr>
+          <a:lstStyle/>
+          <a:p>
+            <a:r>
+              <a:rPr lang="en-GB" sz="1400" i="1" dirty="0">
+                <a:solidFill>
+                  <a:schemeClr val="bg2"/>
+                </a:solidFill>
+              </a:rPr>
+              <a:t>Note: other covariate coefficients not shown.</a:t>
+            </a:r>
+          </a:p>
+          <a:p>
+            <a:r>
+              <a:rPr lang="en-GB" sz="1400" i="1" u="sng" dirty="0">
+                <a:solidFill>
+                  <a:schemeClr val="bg2"/>
+                </a:solidFill>
+              </a:rPr>
+              <a:t>Base case</a:t>
+            </a:r>
+            <a:r>
+              <a:rPr lang="en-GB" sz="1400" i="1" dirty="0">
+                <a:solidFill>
+                  <a:schemeClr val="bg2"/>
+                </a:solidFill>
+              </a:rPr>
+              <a:t>: non-parent, non-London, male, white, age 25-34, youngest child aged &lt;2yrs, single, no work-limiting health, no children</a:t>
+            </a:r>
+          </a:p>
+        </p:txBody>
+      </p:sp>
+      <p:sp>
+        <p:nvSpPr>
+          <p:cNvPr id="11" name="Rectangle 10">
+            <a:extLst>
+              <a:ext uri="{FF2B5EF4-FFF2-40B4-BE49-F238E27FC236}">
+                <a16:creationId xmlns:a16="http://schemas.microsoft.com/office/drawing/2014/main" id="{5D94D55F-EF6F-44C0-AFF7-8793E2B79C33}"/>
+              </a:ext>
+            </a:extLst>
+          </p:cNvPr>
+          <p:cNvSpPr/>
+          <p:nvPr/>
+        </p:nvSpPr>
+        <p:spPr>
+          <a:xfrm>
+            <a:off x="1181819" y="4994694"/>
+            <a:ext cx="3778370" cy="759125"/>
+          </a:xfrm>
+          <a:prstGeom prst="rect">
+            <a:avLst/>
+          </a:prstGeom>
+          <a:noFill/>
+          <a:ln w="28575">
+            <a:solidFill>
+              <a:srgbClr val="FF0000"/>
+            </a:solidFill>
+          </a:ln>
+        </p:spPr>
+        <p:style>
+          <a:lnRef idx="2">
+            <a:schemeClr val="accent1">
+              <a:shade val="50000"/>
+            </a:schemeClr>
+          </a:lnRef>
+          <a:fillRef idx="1">
+            <a:schemeClr val="accent1"/>
+          </a:fillRef>
+          <a:effectRef idx="0">
+            <a:schemeClr val="accent1"/>
+          </a:effectRef>
+          <a:fontRef idx="minor">
+            <a:schemeClr val="lt1"/>
+          </a:fontRef>
+        </p:style>
+        <p:txBody>
+          <a:bodyPr rtlCol="0" anchor="ctr"/>
+          <a:lstStyle/>
+          <a:p>
+            <a:pPr algn="ctr"/>
             <a:endParaRPr lang="en-GB"/>
           </a:p>
         </p:txBody>

</xml_diff>

<commit_message>
subset data to female only for regressions
</commit_message>
<xml_diff>
--- a/Non-R/Internal slidedeck.pptx
+++ b/Non-R/Internal slidedeck.pptx
@@ -5,7 +5,7 @@
     <p:sldMasterId id="2147483660" r:id="rId1"/>
   </p:sldMasterIdLst>
   <p:notesMasterIdLst>
-    <p:notesMasterId r:id="rId9"/>
+    <p:notesMasterId r:id="rId12"/>
   </p:notesMasterIdLst>
   <p:sldIdLst>
     <p:sldId id="256" r:id="rId2"/>
@@ -13,8 +13,11 @@
     <p:sldId id="258" r:id="rId4"/>
     <p:sldId id="260" r:id="rId5"/>
     <p:sldId id="259" r:id="rId6"/>
-    <p:sldId id="261" r:id="rId7"/>
-    <p:sldId id="262" r:id="rId8"/>
+    <p:sldId id="264" r:id="rId7"/>
+    <p:sldId id="263" r:id="rId8"/>
+    <p:sldId id="262" r:id="rId9"/>
+    <p:sldId id="265" r:id="rId10"/>
+    <p:sldId id="261" r:id="rId11"/>
   </p:sldIdLst>
   <p:sldSz cx="12192000" cy="6858000"/>
   <p:notesSz cx="6858000" cy="9144000"/>
@@ -119,6 +122,12 @@
     </p:ext>
   </p:extLst>
 </p:presentation>
+</file>
+
+<file path=ppt/authors.xml><?xml version="1.0" encoding="utf-8"?>
+<p188:authorLst xmlns:a="http://schemas.openxmlformats.org/drawingml/2006/main" xmlns:r="http://schemas.openxmlformats.org/officeDocument/2006/relationships" xmlns:p188="http://schemas.microsoft.com/office/powerpoint/2018/8/main">
+  <p188:author id="{2312FB27-1B4C-E44B-C091-7573519CE921}" name="Ammar Ljubijankic" initials="AL" userId="Ammar Ljubijankic" providerId="None"/>
+</p188:authorLst>
 </file>
 
 <file path=ppt/charts/chart1.xml><?xml version="1.0" encoding="utf-8"?>
@@ -2388,6 +2397,689 @@
                     <a:lumOff val="35000"/>
                   </a:schemeClr>
                 </a:solidFill>
+                <a:latin typeface="Arial" panose="020B0604020202020204" pitchFamily="34" charset="0"/>
+                <a:ea typeface="+mn-ea"/>
+                <a:cs typeface="Arial" panose="020B0604020202020204" pitchFamily="34" charset="0"/>
+              </a:defRPr>
+            </a:pPr>
+            <a:r>
+              <a:rPr lang="en-GB" b="1"/>
+              <a:t>Employment rate,</a:t>
+            </a:r>
+            <a:r>
+              <a:rPr lang="en-GB" b="1" baseline="0"/>
+              <a:t> female parents</a:t>
+            </a:r>
+            <a:r>
+              <a:rPr lang="en-GB" b="1"/>
+              <a:t>, 2018-2022</a:t>
+            </a:r>
+          </a:p>
+        </c:rich>
+      </c:tx>
+      <c:layout>
+        <c:manualLayout>
+          <c:xMode val="edge"/>
+          <c:yMode val="edge"/>
+          <c:x val="1.9416666666666652E-2"/>
+          <c:y val="2.2727272727272728E-2"/>
+        </c:manualLayout>
+      </c:layout>
+      <c:overlay val="0"/>
+      <c:spPr>
+        <a:noFill/>
+        <a:ln>
+          <a:noFill/>
+        </a:ln>
+        <a:effectLst/>
+      </c:spPr>
+      <c:txPr>
+        <a:bodyPr rot="0" spcFirstLastPara="1" vertOverflow="ellipsis" vert="horz" wrap="square" anchor="ctr" anchorCtr="1"/>
+        <a:lstStyle/>
+        <a:p>
+          <a:pPr>
+            <a:defRPr sz="1400" b="1" i="0" u="none" strike="noStrike" kern="1200" spc="0" baseline="0">
+              <a:solidFill>
+                <a:schemeClr val="tx1">
+                  <a:lumMod val="65000"/>
+                  <a:lumOff val="35000"/>
+                </a:schemeClr>
+              </a:solidFill>
+              <a:latin typeface="Arial" panose="020B0604020202020204" pitchFamily="34" charset="0"/>
+              <a:ea typeface="+mn-ea"/>
+              <a:cs typeface="Arial" panose="020B0604020202020204" pitchFamily="34" charset="0"/>
+            </a:defRPr>
+          </a:pPr>
+          <a:endParaRPr lang="en-US"/>
+        </a:p>
+      </c:txPr>
+    </c:title>
+    <c:autoTitleDeleted val="0"/>
+    <c:plotArea>
+      <c:layout/>
+      <c:areaChart>
+        <c:grouping val="stacked"/>
+        <c:varyColors val="0"/>
+        <c:ser>
+          <c:idx val="3"/>
+          <c:order val="2"/>
+          <c:tx>
+            <c:strRef>
+              <c:f>Sheet1!$N$37</c:f>
+              <c:strCache>
+                <c:ptCount val="1"/>
+                <c:pt idx="0">
+                  <c:v>lmin</c:v>
+                </c:pt>
+              </c:strCache>
+            </c:strRef>
+          </c:tx>
+          <c:spPr>
+            <a:noFill/>
+            <a:ln w="25400">
+              <a:noFill/>
+            </a:ln>
+            <a:effectLst/>
+          </c:spPr>
+          <c:val>
+            <c:numRef>
+              <c:f>Sheet1!$N$38:$N$42</c:f>
+              <c:numCache>
+                <c:formatCode>0.0%</c:formatCode>
+                <c:ptCount val="5"/>
+                <c:pt idx="0">
+                  <c:v>0.67070957270610998</c:v>
+                </c:pt>
+                <c:pt idx="1">
+                  <c:v>0.67534028762930876</c:v>
+                </c:pt>
+                <c:pt idx="2">
+                  <c:v>0.67890648670510312</c:v>
+                </c:pt>
+                <c:pt idx="3">
+                  <c:v>0.68601687503403153</c:v>
+                </c:pt>
+                <c:pt idx="4">
+                  <c:v>0.67575157693449572</c:v>
+                </c:pt>
+              </c:numCache>
+            </c:numRef>
+          </c:val>
+          <c:extLst>
+            <c:ext xmlns:c16="http://schemas.microsoft.com/office/drawing/2014/chart" uri="{C3380CC4-5D6E-409C-BE32-E72D297353CC}">
+              <c16:uniqueId val="{00000000-FCD6-4572-88B7-AE39D517864D}"/>
+            </c:ext>
+          </c:extLst>
+        </c:ser>
+        <c:ser>
+          <c:idx val="2"/>
+          <c:order val="3"/>
+          <c:tx>
+            <c:strRef>
+              <c:f>Sheet1!$O$37</c:f>
+              <c:strCache>
+                <c:ptCount val="1"/>
+                <c:pt idx="0">
+                  <c:v>lmax</c:v>
+                </c:pt>
+              </c:strCache>
+            </c:strRef>
+          </c:tx>
+          <c:spPr>
+            <a:solidFill>
+              <a:schemeClr val="accent1">
+                <a:lumMod val="20000"/>
+                <a:lumOff val="80000"/>
+              </a:schemeClr>
+            </a:solidFill>
+            <a:ln w="25400">
+              <a:noFill/>
+            </a:ln>
+            <a:effectLst/>
+          </c:spPr>
+          <c:val>
+            <c:numRef>
+              <c:f>Sheet1!$O$38:$O$42</c:f>
+              <c:numCache>
+                <c:formatCode>0.0%</c:formatCode>
+                <c:ptCount val="5"/>
+                <c:pt idx="0">
+                  <c:v>2.6060549218728024E-2</c:v>
+                </c:pt>
+                <c:pt idx="1">
+                  <c:v>2.6856977483998401E-2</c:v>
+                </c:pt>
+                <c:pt idx="2">
+                  <c:v>3.2339718410387741E-2</c:v>
+                </c:pt>
+                <c:pt idx="3">
+                  <c:v>3.271041115092288E-2</c:v>
+                </c:pt>
+                <c:pt idx="4">
+                  <c:v>3.4637029809506448E-2</c:v>
+                </c:pt>
+              </c:numCache>
+            </c:numRef>
+          </c:val>
+          <c:extLst>
+            <c:ext xmlns:c16="http://schemas.microsoft.com/office/drawing/2014/chart" uri="{C3380CC4-5D6E-409C-BE32-E72D297353CC}">
+              <c16:uniqueId val="{00000001-FCD6-4572-88B7-AE39D517864D}"/>
+            </c:ext>
+          </c:extLst>
+        </c:ser>
+        <c:ser>
+          <c:idx val="5"/>
+          <c:order val="4"/>
+          <c:tx>
+            <c:strRef>
+              <c:f>Sheet1!$P$37</c:f>
+              <c:strCache>
+                <c:ptCount val="1"/>
+                <c:pt idx="0">
+                  <c:v>umin</c:v>
+                </c:pt>
+              </c:strCache>
+            </c:strRef>
+          </c:tx>
+          <c:spPr>
+            <a:noFill/>
+            <a:ln w="25400">
+              <a:noFill/>
+            </a:ln>
+            <a:effectLst/>
+          </c:spPr>
+          <c:val>
+            <c:numRef>
+              <c:f>Sheet1!$P$38:$P$42</c:f>
+              <c:numCache>
+                <c:formatCode>0.0%</c:formatCode>
+                <c:ptCount val="5"/>
+                <c:pt idx="0">
+                  <c:v>4.1048370867461048E-2</c:v>
+                </c:pt>
+                <c:pt idx="1">
+                  <c:v>4.4288656140220817E-2</c:v>
+                </c:pt>
+                <c:pt idx="2">
+                  <c:v>3.782899966567399E-2</c:v>
+                </c:pt>
+                <c:pt idx="3">
+                  <c:v>3.2086818103311487E-2</c:v>
+                </c:pt>
+                <c:pt idx="4">
+                  <c:v>3.9829259390829819E-2</c:v>
+                </c:pt>
+              </c:numCache>
+            </c:numRef>
+          </c:val>
+          <c:extLst>
+            <c:ext xmlns:c16="http://schemas.microsoft.com/office/drawing/2014/chart" uri="{C3380CC4-5D6E-409C-BE32-E72D297353CC}">
+              <c16:uniqueId val="{00000002-FCD6-4572-88B7-AE39D517864D}"/>
+            </c:ext>
+          </c:extLst>
+        </c:ser>
+        <c:ser>
+          <c:idx val="4"/>
+          <c:order val="5"/>
+          <c:tx>
+            <c:strRef>
+              <c:f>Sheet1!$Q$37</c:f>
+              <c:strCache>
+                <c:ptCount val="1"/>
+                <c:pt idx="0">
+                  <c:v>umax</c:v>
+                </c:pt>
+              </c:strCache>
+            </c:strRef>
+          </c:tx>
+          <c:spPr>
+            <a:solidFill>
+              <a:schemeClr val="accent2">
+                <a:lumMod val="20000"/>
+                <a:lumOff val="80000"/>
+              </a:schemeClr>
+            </a:solidFill>
+            <a:ln w="25400">
+              <a:noFill/>
+            </a:ln>
+            <a:effectLst/>
+          </c:spPr>
+          <c:val>
+            <c:numRef>
+              <c:f>Sheet1!$Q$38:$Q$42</c:f>
+              <c:numCache>
+                <c:formatCode>0.0%</c:formatCode>
+                <c:ptCount val="5"/>
+                <c:pt idx="0">
+                  <c:v>8.3920848192557962E-3</c:v>
+                </c:pt>
+                <c:pt idx="1">
+                  <c:v>8.5144671961021601E-3</c:v>
+                </c:pt>
+                <c:pt idx="2">
+                  <c:v>1.021825034791024E-2</c:v>
+                </c:pt>
+                <c:pt idx="3">
+                  <c:v>1.056007149377014E-2</c:v>
+                </c:pt>
+                <c:pt idx="4">
+                  <c:v>1.0894423690529953E-2</c:v>
+                </c:pt>
+              </c:numCache>
+            </c:numRef>
+          </c:val>
+          <c:extLst>
+            <c:ext xmlns:c16="http://schemas.microsoft.com/office/drawing/2014/chart" uri="{C3380CC4-5D6E-409C-BE32-E72D297353CC}">
+              <c16:uniqueId val="{00000003-FCD6-4572-88B7-AE39D517864D}"/>
+            </c:ext>
+          </c:extLst>
+        </c:ser>
+        <c:dLbls>
+          <c:showLegendKey val="0"/>
+          <c:showVal val="0"/>
+          <c:showCatName val="0"/>
+          <c:showSerName val="0"/>
+          <c:showPercent val="0"/>
+          <c:showBubbleSize val="0"/>
+        </c:dLbls>
+        <c:axId val="313329504"/>
+        <c:axId val="313330160"/>
+      </c:areaChart>
+      <c:lineChart>
+        <c:grouping val="standard"/>
+        <c:varyColors val="0"/>
+        <c:ser>
+          <c:idx val="0"/>
+          <c:order val="0"/>
+          <c:tx>
+            <c:strRef>
+              <c:f>Sheet1!$C$36</c:f>
+              <c:strCache>
+                <c:ptCount val="1"/>
+                <c:pt idx="0">
+                  <c:v>London</c:v>
+                </c:pt>
+              </c:strCache>
+            </c:strRef>
+          </c:tx>
+          <c:spPr>
+            <a:ln w="28575" cap="rnd">
+              <a:solidFill>
+                <a:schemeClr val="accent1"/>
+              </a:solidFill>
+              <a:round/>
+            </a:ln>
+            <a:effectLst/>
+          </c:spPr>
+          <c:marker>
+            <c:symbol val="none"/>
+          </c:marker>
+          <c:cat>
+            <c:numRef>
+              <c:f>Sheet1!$B$8:$B$12</c:f>
+              <c:numCache>
+                <c:formatCode>General</c:formatCode>
+                <c:ptCount val="5"/>
+                <c:pt idx="0">
+                  <c:v>2018</c:v>
+                </c:pt>
+                <c:pt idx="1">
+                  <c:v>2019</c:v>
+                </c:pt>
+                <c:pt idx="2">
+                  <c:v>2020</c:v>
+                </c:pt>
+                <c:pt idx="3">
+                  <c:v>2021</c:v>
+                </c:pt>
+                <c:pt idx="4">
+                  <c:v>2022</c:v>
+                </c:pt>
+              </c:numCache>
+            </c:numRef>
+          </c:cat>
+          <c:val>
+            <c:numRef>
+              <c:f>Sheet1!$C$38:$C$42</c:f>
+              <c:numCache>
+                <c:formatCode>0.0%</c:formatCode>
+                <c:ptCount val="5"/>
+                <c:pt idx="0">
+                  <c:v>0.68373984731547399</c:v>
+                </c:pt>
+                <c:pt idx="1">
+                  <c:v>0.68876877637130796</c:v>
+                </c:pt>
+                <c:pt idx="2">
+                  <c:v>0.69507634591029699</c:v>
+                </c:pt>
+                <c:pt idx="3">
+                  <c:v>0.70237208060949297</c:v>
+                </c:pt>
+                <c:pt idx="4">
+                  <c:v>0.69307009183924895</c:v>
+                </c:pt>
+              </c:numCache>
+            </c:numRef>
+          </c:val>
+          <c:smooth val="0"/>
+          <c:extLst>
+            <c:ext xmlns:c16="http://schemas.microsoft.com/office/drawing/2014/chart" uri="{C3380CC4-5D6E-409C-BE32-E72D297353CC}">
+              <c16:uniqueId val="{00000004-FCD6-4572-88B7-AE39D517864D}"/>
+            </c:ext>
+          </c:extLst>
+        </c:ser>
+        <c:ser>
+          <c:idx val="1"/>
+          <c:order val="1"/>
+          <c:tx>
+            <c:strRef>
+              <c:f>Sheet1!$H$36</c:f>
+              <c:strCache>
+                <c:ptCount val="1"/>
+                <c:pt idx="0">
+                  <c:v>UK</c:v>
+                </c:pt>
+              </c:strCache>
+            </c:strRef>
+          </c:tx>
+          <c:spPr>
+            <a:ln w="28575" cap="rnd">
+              <a:solidFill>
+                <a:schemeClr val="accent2"/>
+              </a:solidFill>
+              <a:round/>
+            </a:ln>
+            <a:effectLst/>
+          </c:spPr>
+          <c:marker>
+            <c:symbol val="none"/>
+          </c:marker>
+          <c:val>
+            <c:numRef>
+              <c:f>Sheet1!$H$38:$H$42</c:f>
+              <c:numCache>
+                <c:formatCode>0.0%</c:formatCode>
+                <c:ptCount val="5"/>
+                <c:pt idx="0">
+                  <c:v>0.74201453520192695</c:v>
+                </c:pt>
+                <c:pt idx="1">
+                  <c:v>0.75074315485157905</c:v>
+                </c:pt>
+                <c:pt idx="2">
+                  <c:v>0.75418432995511997</c:v>
+                </c:pt>
+                <c:pt idx="3">
+                  <c:v>0.75609414003515096</c:v>
+                </c:pt>
+                <c:pt idx="4">
+                  <c:v>0.75566507798009697</c:v>
+                </c:pt>
+              </c:numCache>
+            </c:numRef>
+          </c:val>
+          <c:smooth val="0"/>
+          <c:extLst>
+            <c:ext xmlns:c16="http://schemas.microsoft.com/office/drawing/2014/chart" uri="{C3380CC4-5D6E-409C-BE32-E72D297353CC}">
+              <c16:uniqueId val="{00000005-FCD6-4572-88B7-AE39D517864D}"/>
+            </c:ext>
+          </c:extLst>
+        </c:ser>
+        <c:dLbls>
+          <c:showLegendKey val="0"/>
+          <c:showVal val="0"/>
+          <c:showCatName val="0"/>
+          <c:showSerName val="0"/>
+          <c:showPercent val="0"/>
+          <c:showBubbleSize val="0"/>
+        </c:dLbls>
+        <c:marker val="1"/>
+        <c:smooth val="0"/>
+        <c:axId val="313329504"/>
+        <c:axId val="313330160"/>
+      </c:lineChart>
+      <c:catAx>
+        <c:axId val="313329504"/>
+        <c:scaling>
+          <c:orientation val="minMax"/>
+        </c:scaling>
+        <c:delete val="0"/>
+        <c:axPos val="b"/>
+        <c:numFmt formatCode="General" sourceLinked="1"/>
+        <c:majorTickMark val="none"/>
+        <c:minorTickMark val="none"/>
+        <c:tickLblPos val="nextTo"/>
+        <c:spPr>
+          <a:noFill/>
+          <a:ln w="9525" cap="flat" cmpd="sng" algn="ctr">
+            <a:solidFill>
+              <a:schemeClr val="tx1">
+                <a:lumMod val="15000"/>
+                <a:lumOff val="85000"/>
+              </a:schemeClr>
+            </a:solidFill>
+            <a:round/>
+          </a:ln>
+          <a:effectLst/>
+        </c:spPr>
+        <c:txPr>
+          <a:bodyPr rot="-60000000" spcFirstLastPara="1" vertOverflow="ellipsis" vert="horz" wrap="square" anchor="ctr" anchorCtr="1"/>
+          <a:lstStyle/>
+          <a:p>
+            <a:pPr>
+              <a:defRPr sz="900" b="0" i="0" u="none" strike="noStrike" kern="1200" baseline="0">
+                <a:solidFill>
+                  <a:schemeClr val="tx1">
+                    <a:lumMod val="65000"/>
+                    <a:lumOff val="35000"/>
+                  </a:schemeClr>
+                </a:solidFill>
+                <a:latin typeface="Arial" panose="020B0604020202020204" pitchFamily="34" charset="0"/>
+                <a:ea typeface="+mn-ea"/>
+                <a:cs typeface="Arial" panose="020B0604020202020204" pitchFamily="34" charset="0"/>
+              </a:defRPr>
+            </a:pPr>
+            <a:endParaRPr lang="en-US"/>
+          </a:p>
+        </c:txPr>
+        <c:crossAx val="313330160"/>
+        <c:crosses val="autoZero"/>
+        <c:auto val="1"/>
+        <c:lblAlgn val="ctr"/>
+        <c:lblOffset val="100"/>
+        <c:noMultiLvlLbl val="0"/>
+      </c:catAx>
+      <c:valAx>
+        <c:axId val="313330160"/>
+        <c:scaling>
+          <c:orientation val="minMax"/>
+        </c:scaling>
+        <c:delete val="0"/>
+        <c:axPos val="l"/>
+        <c:majorGridlines>
+          <c:spPr>
+            <a:ln w="9525" cap="flat" cmpd="sng" algn="ctr">
+              <a:solidFill>
+                <a:schemeClr val="tx1">
+                  <a:lumMod val="15000"/>
+                  <a:lumOff val="85000"/>
+                </a:schemeClr>
+              </a:solidFill>
+              <a:round/>
+            </a:ln>
+            <a:effectLst/>
+          </c:spPr>
+        </c:majorGridlines>
+        <c:numFmt formatCode="0%" sourceLinked="0"/>
+        <c:majorTickMark val="none"/>
+        <c:minorTickMark val="none"/>
+        <c:tickLblPos val="nextTo"/>
+        <c:spPr>
+          <a:noFill/>
+          <a:ln>
+            <a:noFill/>
+          </a:ln>
+          <a:effectLst/>
+        </c:spPr>
+        <c:txPr>
+          <a:bodyPr rot="-60000000" spcFirstLastPara="1" vertOverflow="ellipsis" vert="horz" wrap="square" anchor="ctr" anchorCtr="1"/>
+          <a:lstStyle/>
+          <a:p>
+            <a:pPr>
+              <a:defRPr sz="900" b="0" i="0" u="none" strike="noStrike" kern="1200" baseline="0">
+                <a:solidFill>
+                  <a:schemeClr val="tx1">
+                    <a:lumMod val="65000"/>
+                    <a:lumOff val="35000"/>
+                  </a:schemeClr>
+                </a:solidFill>
+                <a:latin typeface="Arial" panose="020B0604020202020204" pitchFamily="34" charset="0"/>
+                <a:ea typeface="+mn-ea"/>
+                <a:cs typeface="Arial" panose="020B0604020202020204" pitchFamily="34" charset="0"/>
+              </a:defRPr>
+            </a:pPr>
+            <a:endParaRPr lang="en-US"/>
+          </a:p>
+        </c:txPr>
+        <c:crossAx val="313329504"/>
+        <c:crosses val="autoZero"/>
+        <c:crossBetween val="between"/>
+        <c:majorUnit val="5.000000000000001E-2"/>
+      </c:valAx>
+      <c:spPr>
+        <a:noFill/>
+        <a:ln>
+          <a:noFill/>
+        </a:ln>
+        <a:effectLst/>
+      </c:spPr>
+    </c:plotArea>
+    <c:legend>
+      <c:legendPos val="t"/>
+      <c:legendEntry>
+        <c:idx val="0"/>
+        <c:delete val="1"/>
+      </c:legendEntry>
+      <c:legendEntry>
+        <c:idx val="1"/>
+        <c:delete val="1"/>
+      </c:legendEntry>
+      <c:legendEntry>
+        <c:idx val="2"/>
+        <c:delete val="1"/>
+      </c:legendEntry>
+      <c:legendEntry>
+        <c:idx val="3"/>
+        <c:delete val="1"/>
+      </c:legendEntry>
+      <c:layout>
+        <c:manualLayout>
+          <c:xMode val="edge"/>
+          <c:yMode val="edge"/>
+          <c:x val="2.4542203963634983E-2"/>
+          <c:y val="8.5909437510944903E-2"/>
+          <c:w val="0.27800850368834246"/>
+          <c:h val="6.2257248244319108E-2"/>
+        </c:manualLayout>
+      </c:layout>
+      <c:overlay val="0"/>
+      <c:spPr>
+        <a:noFill/>
+        <a:ln>
+          <a:noFill/>
+        </a:ln>
+        <a:effectLst/>
+      </c:spPr>
+      <c:txPr>
+        <a:bodyPr rot="0" spcFirstLastPara="1" vertOverflow="ellipsis" vert="horz" wrap="square" anchor="ctr" anchorCtr="1"/>
+        <a:lstStyle/>
+        <a:p>
+          <a:pPr>
+            <a:defRPr sz="900" b="0" i="0" u="none" strike="noStrike" kern="1200" baseline="0">
+              <a:solidFill>
+                <a:schemeClr val="tx1">
+                  <a:lumMod val="65000"/>
+                  <a:lumOff val="35000"/>
+                </a:schemeClr>
+              </a:solidFill>
+              <a:latin typeface="Arial" panose="020B0604020202020204" pitchFamily="34" charset="0"/>
+              <a:ea typeface="+mn-ea"/>
+              <a:cs typeface="Arial" panose="020B0604020202020204" pitchFamily="34" charset="0"/>
+            </a:defRPr>
+          </a:pPr>
+          <a:endParaRPr lang="en-US"/>
+        </a:p>
+      </c:txPr>
+    </c:legend>
+    <c:plotVisOnly val="1"/>
+    <c:dispBlanksAs val="gap"/>
+    <c:extLst>
+      <c:ext xmlns:c16r3="http://schemas.microsoft.com/office/drawing/2017/03/chart" uri="{56B9EC1D-385E-4148-901F-78D8002777C0}">
+        <c16r3:dataDisplayOptions16>
+          <c16r3:dispNaAsBlank val="1"/>
+        </c16r3:dataDisplayOptions16>
+      </c:ext>
+    </c:extLst>
+    <c:showDLblsOverMax val="0"/>
+  </c:chart>
+  <c:spPr>
+    <a:solidFill>
+      <a:schemeClr val="bg1"/>
+    </a:solidFill>
+    <a:ln w="9525" cap="flat" cmpd="sng" algn="ctr">
+      <a:noFill/>
+      <a:round/>
+    </a:ln>
+    <a:effectLst/>
+  </c:spPr>
+  <c:txPr>
+    <a:bodyPr/>
+    <a:lstStyle/>
+    <a:p>
+      <a:pPr>
+        <a:defRPr>
+          <a:latin typeface="Arial" panose="020B0604020202020204" pitchFamily="34" charset="0"/>
+          <a:cs typeface="Arial" panose="020B0604020202020204" pitchFamily="34" charset="0"/>
+        </a:defRPr>
+      </a:pPr>
+      <a:endParaRPr lang="en-US"/>
+    </a:p>
+  </c:txPr>
+  <c:externalData r:id="rId3">
+    <c:autoUpdate val="0"/>
+  </c:externalData>
+</c:chartSpace>
+</file>
+
+<file path=ppt/charts/chart6.xml><?xml version="1.0" encoding="utf-8"?>
+<c:chartSpace xmlns:c="http://schemas.openxmlformats.org/drawingml/2006/chart" xmlns:a="http://schemas.openxmlformats.org/drawingml/2006/main" xmlns:r="http://schemas.openxmlformats.org/officeDocument/2006/relationships" xmlns:c16r2="http://schemas.microsoft.com/office/drawing/2015/06/chart">
+  <c:date1904 val="0"/>
+  <c:lang val="en-US"/>
+  <c:roundedCorners val="0"/>
+  <mc:AlternateContent xmlns:mc="http://schemas.openxmlformats.org/markup-compatibility/2006">
+    <mc:Choice xmlns:c14="http://schemas.microsoft.com/office/drawing/2007/8/2/chart" Requires="c14">
+      <c14:style val="102"/>
+    </mc:Choice>
+    <mc:Fallback>
+      <c:style val="2"/>
+    </mc:Fallback>
+  </mc:AlternateContent>
+  <c:chart>
+    <c:title>
+      <c:tx>
+        <c:rich>
+          <a:bodyPr rot="0" spcFirstLastPara="1" vertOverflow="ellipsis" vert="horz" wrap="square" anchor="ctr" anchorCtr="1"/>
+          <a:lstStyle/>
+          <a:p>
+            <a:pPr>
+              <a:defRPr sz="1400" b="1" i="0" u="none" strike="noStrike" kern="1200" spc="0" baseline="0">
+                <a:solidFill>
+                  <a:schemeClr val="tx1">
+                    <a:lumMod val="65000"/>
+                    <a:lumOff val="35000"/>
+                  </a:schemeClr>
+                </a:solidFill>
                 <a:latin typeface="+mn-lt"/>
                 <a:ea typeface="+mn-ea"/>
                 <a:cs typeface="+mn-cs"/>
@@ -2496,7 +3188,7 @@
                   <a:bodyPr/>
                   <a:lstStyle/>
                   <a:p>
-                    <a:fld id="{4845A5F9-0168-496E-9533-F099D97B3F0A}" type="CELLRANGE">
+                    <a:fld id="{79EBDB03-5CD5-4FC2-808E-807135755E18}" type="CELLRANGE">
                       <a:rPr lang="en-US"/>
                       <a:pPr/>
                       <a:t>[CELLRANGE]</a:t>
@@ -2538,7 +3230,7 @@
                   <a:bodyPr/>
                   <a:lstStyle/>
                   <a:p>
-                    <a:fld id="{7C0D4C19-3AFE-4728-9129-1B1142F224C7}" type="CELLRANGE">
+                    <a:fld id="{BA2F1840-4437-4B80-847F-2EEBFA649A45}" type="CELLRANGE">
                       <a:rPr lang="en-GB"/>
                       <a:pPr/>
                       <a:t>[CELLRANGE]</a:t>
@@ -2730,7 +3422,7 @@
                   <a:bodyPr/>
                   <a:lstStyle/>
                   <a:p>
-                    <a:fld id="{FFACE679-B977-48D0-8407-8A4316D35814}" type="CELLRANGE">
+                    <a:fld id="{25718625-8DD3-483F-AC71-EF19AB7AD89C}" type="CELLRANGE">
                       <a:rPr lang="en-US"/>
                       <a:pPr/>
                       <a:t>[CELLRANGE]</a:t>
@@ -2762,7 +3454,7 @@
                   <a:bodyPr/>
                   <a:lstStyle/>
                   <a:p>
-                    <a:fld id="{52C9C9DF-63EC-4E1F-AE2C-89FE32284B68}" type="CELLRANGE">
+                    <a:fld id="{3DEC4141-D2A3-4BA2-B17B-950294888830}" type="CELLRANGE">
                       <a:rPr lang="en-GB"/>
                       <a:pPr/>
                       <a:t>[CELLRANGE]</a:t>
@@ -2795,7 +3487,7 @@
                   <a:bodyPr/>
                   <a:lstStyle/>
                   <a:p>
-                    <a:fld id="{30777EC8-8ECD-479B-9325-9A9416DB3D04}" type="CELLRANGE">
+                    <a:fld id="{40545462-DE1F-4DCE-9671-9A2059A80A82}" type="CELLRANGE">
                       <a:rPr lang="en-GB"/>
                       <a:pPr/>
                       <a:t>[CELLRANGE]</a:t>
@@ -2828,7 +3520,7 @@
                   <a:bodyPr/>
                   <a:lstStyle/>
                   <a:p>
-                    <a:fld id="{5C193C29-238F-4B53-8138-7BEF06D8EACD}" type="CELLRANGE">
+                    <a:fld id="{002EE4DA-9395-4EF0-9B85-FDD4D051EA54}" type="CELLRANGE">
                       <a:rPr lang="en-GB"/>
                       <a:pPr/>
                       <a:t>[CELLRANGE]</a:t>
@@ -3017,7 +3709,7 @@
                   <a:bodyPr/>
                   <a:lstStyle/>
                   <a:p>
-                    <a:fld id="{00A380CA-CB8E-4B9F-A5E5-47EB51FCE1E5}" type="CELLRANGE">
+                    <a:fld id="{81754DBE-4B06-4505-96D1-244AD15B08A9}" type="CELLRANGE">
                       <a:rPr lang="en-US"/>
                       <a:pPr/>
                       <a:t>[CELLRANGE]</a:t>
@@ -3049,7 +3741,7 @@
                   <a:bodyPr/>
                   <a:lstStyle/>
                   <a:p>
-                    <a:fld id="{99A2BF98-34D0-4EA4-B154-371323E94E85}" type="CELLRANGE">
+                    <a:fld id="{ADD6C6AE-6F81-4E39-A73A-28F7C5C3041E}" type="CELLRANGE">
                       <a:rPr lang="en-GB"/>
                       <a:pPr/>
                       <a:t>[CELLRANGE]</a:t>
@@ -3082,7 +3774,7 @@
                   <a:bodyPr/>
                   <a:lstStyle/>
                   <a:p>
-                    <a:fld id="{39B6B7FC-527D-4B39-8B3D-3A8F3D658549}" type="CELLRANGE">
+                    <a:fld id="{BA65C899-7277-48AE-B4DA-A9C9334AFC4A}" type="CELLRANGE">
                       <a:rPr lang="en-GB"/>
                       <a:pPr/>
                       <a:t>[CELLRANGE]</a:t>
@@ -3115,7 +3807,7 @@
                   <a:bodyPr/>
                   <a:lstStyle/>
                   <a:p>
-                    <a:fld id="{F2F22E85-8B86-4CEA-A1BD-8DC427F50287}" type="CELLRANGE">
+                    <a:fld id="{6174ACAB-2A8C-4963-B51E-9CD2B501BA37}" type="CELLRANGE">
                       <a:rPr lang="en-GB"/>
                       <a:pPr/>
                       <a:t>[CELLRANGE]</a:t>
@@ -3304,7 +3996,7 @@
                   <a:bodyPr/>
                   <a:lstStyle/>
                   <a:p>
-                    <a:fld id="{D89A484D-1613-4EEF-85C4-C7D0D1B53587}" type="CELLRANGE">
+                    <a:fld id="{481FA7D5-A2C4-4699-A203-AECE1F0276D8}" type="CELLRANGE">
                       <a:rPr lang="en-US"/>
                       <a:pPr/>
                       <a:t>[CELLRANGE]</a:t>
@@ -3336,7 +4028,7 @@
                   <a:bodyPr/>
                   <a:lstStyle/>
                   <a:p>
-                    <a:fld id="{D541E7FE-DBF8-4AB2-A2A0-0DF22987E2BD}" type="CELLRANGE">
+                    <a:fld id="{72C70B85-616D-46D5-8C27-AD77A1EC9F46}" type="CELLRANGE">
                       <a:rPr lang="en-GB"/>
                       <a:pPr/>
                       <a:t>[CELLRANGE]</a:t>
@@ -3369,7 +4061,7 @@
                   <a:bodyPr/>
                   <a:lstStyle/>
                   <a:p>
-                    <a:fld id="{AD80323C-B3F5-4655-93F0-F2AED5D8FC5B}" type="CELLRANGE">
+                    <a:fld id="{E63B25E4-DCC5-4483-8619-43DB5922F8C6}" type="CELLRANGE">
                       <a:rPr lang="en-GB"/>
                       <a:pPr/>
                       <a:t>[CELLRANGE]</a:t>
@@ -3402,7 +4094,7 @@
                   <a:bodyPr/>
                   <a:lstStyle/>
                   <a:p>
-                    <a:fld id="{A15554E5-15AC-4B31-AF4B-6246A1EC8E10}" type="CELLRANGE">
+                    <a:fld id="{3A149E63-28C4-469D-92BC-BC489DB60879}" type="CELLRANGE">
                       <a:rPr lang="en-GB"/>
                       <a:pPr/>
                       <a:t>[CELLRANGE]</a:t>
@@ -3591,7 +4283,7 @@
                   <a:bodyPr/>
                   <a:lstStyle/>
                   <a:p>
-                    <a:fld id="{695E9E8A-4C6B-4DB8-B626-77986D31A0AF}" type="CELLRANGE">
+                    <a:fld id="{FE93B706-C889-4D71-9C48-A67A57512E9B}" type="CELLRANGE">
                       <a:rPr lang="en-US"/>
                       <a:pPr/>
                       <a:t>[CELLRANGE]</a:t>
@@ -3623,7 +4315,7 @@
                   <a:bodyPr/>
                   <a:lstStyle/>
                   <a:p>
-                    <a:fld id="{DDCD2434-8C15-4953-9EB9-4766C8500734}" type="CELLRANGE">
+                    <a:fld id="{EE9A7279-82E6-4B79-A699-B9B41FF79DFD}" type="CELLRANGE">
                       <a:rPr lang="en-GB"/>
                       <a:pPr/>
                       <a:t>[CELLRANGE]</a:t>
@@ -3656,7 +4348,7 @@
                   <a:bodyPr/>
                   <a:lstStyle/>
                   <a:p>
-                    <a:fld id="{9AB2BAF5-6B4C-4CAE-A2D9-4D4BB76A8DB8}" type="CELLRANGE">
+                    <a:fld id="{7048C662-3151-402D-BCBE-1A7EB060CEC0}" type="CELLRANGE">
                       <a:rPr lang="en-GB"/>
                       <a:pPr/>
                       <a:t>[CELLRANGE]</a:t>
@@ -3689,7 +4381,7 @@
                   <a:bodyPr/>
                   <a:lstStyle/>
                   <a:p>
-                    <a:fld id="{25E86E4A-9E03-42D8-8314-203888D3EFA1}" type="CELLRANGE">
+                    <a:fld id="{D9C1A70F-3EC7-4774-9DF9-19F11F38E761}" type="CELLRANGE">
                       <a:rPr lang="en-GB"/>
                       <a:pPr/>
                       <a:t>[CELLRANGE]</a:t>
@@ -4253,6 +4945,46 @@
 </cs:colorStyle>
 </file>
 
+<file path=ppt/charts/colors6.xml><?xml version="1.0" encoding="utf-8"?>
+<cs:colorStyle xmlns:cs="http://schemas.microsoft.com/office/drawing/2012/chartStyle" xmlns:a="http://schemas.openxmlformats.org/drawingml/2006/main" meth="cycle" id="10">
+  <a:schemeClr val="accent1"/>
+  <a:schemeClr val="accent2"/>
+  <a:schemeClr val="accent3"/>
+  <a:schemeClr val="accent4"/>
+  <a:schemeClr val="accent5"/>
+  <a:schemeClr val="accent6"/>
+  <cs:variation/>
+  <cs:variation>
+    <a:lumMod val="60000"/>
+  </cs:variation>
+  <cs:variation>
+    <a:lumMod val="80000"/>
+    <a:lumOff val="20000"/>
+  </cs:variation>
+  <cs:variation>
+    <a:lumMod val="80000"/>
+  </cs:variation>
+  <cs:variation>
+    <a:lumMod val="60000"/>
+    <a:lumOff val="40000"/>
+  </cs:variation>
+  <cs:variation>
+    <a:lumMod val="50000"/>
+  </cs:variation>
+  <cs:variation>
+    <a:lumMod val="70000"/>
+    <a:lumOff val="30000"/>
+  </cs:variation>
+  <cs:variation>
+    <a:lumMod val="70000"/>
+  </cs:variation>
+  <cs:variation>
+    <a:lumMod val="50000"/>
+    <a:lumOff val="50000"/>
+  </cs:variation>
+</cs:colorStyle>
+</file>
+
 <file path=ppt/charts/style1.xml><?xml version="1.0" encoding="utf-8"?>
 <cs:chartStyle xmlns:cs="http://schemas.microsoft.com/office/drawing/2012/chartStyle" xmlns:a="http://schemas.openxmlformats.org/drawingml/2006/main" id="227">
   <cs:axisTitle>
@@ -6279,7 +7011,7 @@
 </file>
 
 <file path=ppt/charts/style5.xml><?xml version="1.0" encoding="utf-8"?>
-<cs:chartStyle xmlns:cs="http://schemas.microsoft.com/office/drawing/2012/chartStyle" xmlns:a="http://schemas.openxmlformats.org/drawingml/2006/main" id="201">
+<cs:chartStyle xmlns:cs="http://schemas.microsoft.com/office/drawing/2012/chartStyle" xmlns:a="http://schemas.openxmlformats.org/drawingml/2006/main" id="227">
   <cs:axisTitle>
     <cs:lnRef idx="0"/>
     <cs:fillRef idx="0"/>
@@ -6387,6 +7119,11 @@
     <cs:fontRef idx="minor">
       <a:schemeClr val="tx1"/>
     </cs:fontRef>
+    <cs:spPr>
+      <a:solidFill>
+        <a:schemeClr val="phClr"/>
+      </a:solidFill>
+    </cs:spPr>
   </cs:dataPoint>
   <cs:dataPoint3D>
     <cs:lnRef idx="0"/>
@@ -6397,6 +7134,11 @@
     <cs:fontRef idx="minor">
       <a:schemeClr val="tx1"/>
     </cs:fontRef>
+    <cs:spPr>
+      <a:solidFill>
+        <a:schemeClr val="phClr"/>
+      </a:solidFill>
+    </cs:spPr>
   </cs:dataPoint3D>
   <cs:dataPointLine>
     <cs:lnRef idx="0">
@@ -6428,6 +7170,9 @@
       <a:schemeClr val="tx1"/>
     </cs:fontRef>
     <cs:spPr>
+      <a:solidFill>
+        <a:schemeClr val="phClr"/>
+      </a:solidFill>
       <a:ln w="9525">
         <a:solidFill>
           <a:schemeClr val="phClr"/>
@@ -6779,6 +7524,530 @@
     </cs:spPr>
   </cs:wall>
 </cs:chartStyle>
+</file>
+
+<file path=ppt/charts/style6.xml><?xml version="1.0" encoding="utf-8"?>
+<cs:chartStyle xmlns:cs="http://schemas.microsoft.com/office/drawing/2012/chartStyle" xmlns:a="http://schemas.openxmlformats.org/drawingml/2006/main" id="201">
+  <cs:axisTitle>
+    <cs:lnRef idx="0"/>
+    <cs:fillRef idx="0"/>
+    <cs:effectRef idx="0"/>
+    <cs:fontRef idx="minor">
+      <a:schemeClr val="tx1">
+        <a:lumMod val="65000"/>
+        <a:lumOff val="35000"/>
+      </a:schemeClr>
+    </cs:fontRef>
+    <cs:defRPr sz="1000" kern="1200"/>
+  </cs:axisTitle>
+  <cs:categoryAxis>
+    <cs:lnRef idx="0"/>
+    <cs:fillRef idx="0"/>
+    <cs:effectRef idx="0"/>
+    <cs:fontRef idx="minor">
+      <a:schemeClr val="tx1">
+        <a:lumMod val="65000"/>
+        <a:lumOff val="35000"/>
+      </a:schemeClr>
+    </cs:fontRef>
+    <cs:spPr>
+      <a:ln w="9525" cap="flat" cmpd="sng" algn="ctr">
+        <a:solidFill>
+          <a:schemeClr val="tx1">
+            <a:lumMod val="15000"/>
+            <a:lumOff val="85000"/>
+          </a:schemeClr>
+        </a:solidFill>
+        <a:round/>
+      </a:ln>
+    </cs:spPr>
+    <cs:defRPr sz="900" kern="1200"/>
+  </cs:categoryAxis>
+  <cs:chartArea mods="allowNoFillOverride allowNoLineOverride">
+    <cs:lnRef idx="0"/>
+    <cs:fillRef idx="0"/>
+    <cs:effectRef idx="0"/>
+    <cs:fontRef idx="minor">
+      <a:schemeClr val="tx1"/>
+    </cs:fontRef>
+    <cs:spPr>
+      <a:solidFill>
+        <a:schemeClr val="bg1"/>
+      </a:solidFill>
+      <a:ln w="9525" cap="flat" cmpd="sng" algn="ctr">
+        <a:solidFill>
+          <a:schemeClr val="tx1">
+            <a:lumMod val="15000"/>
+            <a:lumOff val="85000"/>
+          </a:schemeClr>
+        </a:solidFill>
+        <a:round/>
+      </a:ln>
+    </cs:spPr>
+    <cs:defRPr sz="1000" kern="1200"/>
+  </cs:chartArea>
+  <cs:dataLabel>
+    <cs:lnRef idx="0"/>
+    <cs:fillRef idx="0"/>
+    <cs:effectRef idx="0"/>
+    <cs:fontRef idx="minor">
+      <a:schemeClr val="tx1">
+        <a:lumMod val="75000"/>
+        <a:lumOff val="25000"/>
+      </a:schemeClr>
+    </cs:fontRef>
+    <cs:defRPr sz="900" kern="1200"/>
+  </cs:dataLabel>
+  <cs:dataLabelCallout>
+    <cs:lnRef idx="0"/>
+    <cs:fillRef idx="0"/>
+    <cs:effectRef idx="0"/>
+    <cs:fontRef idx="minor">
+      <a:schemeClr val="dk1">
+        <a:lumMod val="65000"/>
+        <a:lumOff val="35000"/>
+      </a:schemeClr>
+    </cs:fontRef>
+    <cs:spPr>
+      <a:solidFill>
+        <a:schemeClr val="lt1"/>
+      </a:solidFill>
+      <a:ln>
+        <a:solidFill>
+          <a:schemeClr val="dk1">
+            <a:lumMod val="25000"/>
+            <a:lumOff val="75000"/>
+          </a:schemeClr>
+        </a:solidFill>
+      </a:ln>
+    </cs:spPr>
+    <cs:defRPr sz="900" kern="1200"/>
+    <cs:bodyPr rot="0" spcFirstLastPara="1" vertOverflow="clip" horzOverflow="clip" vert="horz" wrap="square" lIns="36576" tIns="18288" rIns="36576" bIns="18288" anchor="ctr" anchorCtr="1">
+      <a:spAutoFit/>
+    </cs:bodyPr>
+  </cs:dataLabelCallout>
+  <cs:dataPoint>
+    <cs:lnRef idx="0"/>
+    <cs:fillRef idx="1">
+      <cs:styleClr val="auto"/>
+    </cs:fillRef>
+    <cs:effectRef idx="0"/>
+    <cs:fontRef idx="minor">
+      <a:schemeClr val="tx1"/>
+    </cs:fontRef>
+  </cs:dataPoint>
+  <cs:dataPoint3D>
+    <cs:lnRef idx="0"/>
+    <cs:fillRef idx="1">
+      <cs:styleClr val="auto"/>
+    </cs:fillRef>
+    <cs:effectRef idx="0"/>
+    <cs:fontRef idx="minor">
+      <a:schemeClr val="tx1"/>
+    </cs:fontRef>
+  </cs:dataPoint3D>
+  <cs:dataPointLine>
+    <cs:lnRef idx="0">
+      <cs:styleClr val="auto"/>
+    </cs:lnRef>
+    <cs:fillRef idx="1"/>
+    <cs:effectRef idx="0"/>
+    <cs:fontRef idx="minor">
+      <a:schemeClr val="tx1"/>
+    </cs:fontRef>
+    <cs:spPr>
+      <a:ln w="28575" cap="rnd">
+        <a:solidFill>
+          <a:schemeClr val="phClr"/>
+        </a:solidFill>
+        <a:round/>
+      </a:ln>
+    </cs:spPr>
+  </cs:dataPointLine>
+  <cs:dataPointMarker>
+    <cs:lnRef idx="0">
+      <cs:styleClr val="auto"/>
+    </cs:lnRef>
+    <cs:fillRef idx="1">
+      <cs:styleClr val="auto"/>
+    </cs:fillRef>
+    <cs:effectRef idx="0"/>
+    <cs:fontRef idx="minor">
+      <a:schemeClr val="tx1"/>
+    </cs:fontRef>
+    <cs:spPr>
+      <a:ln w="9525">
+        <a:solidFill>
+          <a:schemeClr val="phClr"/>
+        </a:solidFill>
+      </a:ln>
+    </cs:spPr>
+  </cs:dataPointMarker>
+  <cs:dataPointMarkerLayout symbol="circle" size="5"/>
+  <cs:dataPointWireframe>
+    <cs:lnRef idx="0">
+      <cs:styleClr val="auto"/>
+    </cs:lnRef>
+    <cs:fillRef idx="1"/>
+    <cs:effectRef idx="0"/>
+    <cs:fontRef idx="minor">
+      <a:schemeClr val="tx1"/>
+    </cs:fontRef>
+    <cs:spPr>
+      <a:ln w="9525" cap="rnd">
+        <a:solidFill>
+          <a:schemeClr val="phClr"/>
+        </a:solidFill>
+        <a:round/>
+      </a:ln>
+    </cs:spPr>
+  </cs:dataPointWireframe>
+  <cs:dataTable>
+    <cs:lnRef idx="0"/>
+    <cs:fillRef idx="0"/>
+    <cs:effectRef idx="0"/>
+    <cs:fontRef idx="minor">
+      <a:schemeClr val="tx1">
+        <a:lumMod val="65000"/>
+        <a:lumOff val="35000"/>
+      </a:schemeClr>
+    </cs:fontRef>
+    <cs:spPr>
+      <a:noFill/>
+      <a:ln w="9525" cap="flat" cmpd="sng" algn="ctr">
+        <a:solidFill>
+          <a:schemeClr val="tx1">
+            <a:lumMod val="15000"/>
+            <a:lumOff val="85000"/>
+          </a:schemeClr>
+        </a:solidFill>
+        <a:round/>
+      </a:ln>
+    </cs:spPr>
+    <cs:defRPr sz="900" kern="1200"/>
+  </cs:dataTable>
+  <cs:downBar>
+    <cs:lnRef idx="0"/>
+    <cs:fillRef idx="0"/>
+    <cs:effectRef idx="0"/>
+    <cs:fontRef idx="minor">
+      <a:schemeClr val="dk1"/>
+    </cs:fontRef>
+    <cs:spPr>
+      <a:solidFill>
+        <a:schemeClr val="dk1">
+          <a:lumMod val="65000"/>
+          <a:lumOff val="35000"/>
+        </a:schemeClr>
+      </a:solidFill>
+      <a:ln w="9525">
+        <a:solidFill>
+          <a:schemeClr val="tx1">
+            <a:lumMod val="65000"/>
+            <a:lumOff val="35000"/>
+          </a:schemeClr>
+        </a:solidFill>
+      </a:ln>
+    </cs:spPr>
+  </cs:downBar>
+  <cs:dropLine>
+    <cs:lnRef idx="0"/>
+    <cs:fillRef idx="0"/>
+    <cs:effectRef idx="0"/>
+    <cs:fontRef idx="minor">
+      <a:schemeClr val="tx1"/>
+    </cs:fontRef>
+    <cs:spPr>
+      <a:ln w="9525" cap="flat" cmpd="sng" algn="ctr">
+        <a:solidFill>
+          <a:schemeClr val="tx1">
+            <a:lumMod val="35000"/>
+            <a:lumOff val="65000"/>
+          </a:schemeClr>
+        </a:solidFill>
+        <a:round/>
+      </a:ln>
+    </cs:spPr>
+  </cs:dropLine>
+  <cs:errorBar>
+    <cs:lnRef idx="0"/>
+    <cs:fillRef idx="0"/>
+    <cs:effectRef idx="0"/>
+    <cs:fontRef idx="minor">
+      <a:schemeClr val="tx1"/>
+    </cs:fontRef>
+    <cs:spPr>
+      <a:ln w="9525" cap="flat" cmpd="sng" algn="ctr">
+        <a:solidFill>
+          <a:schemeClr val="tx1">
+            <a:lumMod val="65000"/>
+            <a:lumOff val="35000"/>
+          </a:schemeClr>
+        </a:solidFill>
+        <a:round/>
+      </a:ln>
+    </cs:spPr>
+  </cs:errorBar>
+  <cs:floor>
+    <cs:lnRef idx="0"/>
+    <cs:fillRef idx="0"/>
+    <cs:effectRef idx="0"/>
+    <cs:fontRef idx="minor">
+      <a:schemeClr val="tx1"/>
+    </cs:fontRef>
+    <cs:spPr>
+      <a:noFill/>
+      <a:ln>
+        <a:noFill/>
+      </a:ln>
+    </cs:spPr>
+  </cs:floor>
+  <cs:gridlineMajor>
+    <cs:lnRef idx="0"/>
+    <cs:fillRef idx="0"/>
+    <cs:effectRef idx="0"/>
+    <cs:fontRef idx="minor">
+      <a:schemeClr val="tx1"/>
+    </cs:fontRef>
+    <cs:spPr>
+      <a:ln w="9525" cap="flat" cmpd="sng" algn="ctr">
+        <a:solidFill>
+          <a:schemeClr val="tx1">
+            <a:lumMod val="15000"/>
+            <a:lumOff val="85000"/>
+          </a:schemeClr>
+        </a:solidFill>
+        <a:round/>
+      </a:ln>
+    </cs:spPr>
+  </cs:gridlineMajor>
+  <cs:gridlineMinor>
+    <cs:lnRef idx="0"/>
+    <cs:fillRef idx="0"/>
+    <cs:effectRef idx="0"/>
+    <cs:fontRef idx="minor">
+      <a:schemeClr val="tx1"/>
+    </cs:fontRef>
+    <cs:spPr>
+      <a:ln w="9525" cap="flat" cmpd="sng" algn="ctr">
+        <a:solidFill>
+          <a:schemeClr val="tx1">
+            <a:lumMod val="5000"/>
+            <a:lumOff val="95000"/>
+          </a:schemeClr>
+        </a:solidFill>
+        <a:round/>
+      </a:ln>
+    </cs:spPr>
+  </cs:gridlineMinor>
+  <cs:hiLoLine>
+    <cs:lnRef idx="0"/>
+    <cs:fillRef idx="0"/>
+    <cs:effectRef idx="0"/>
+    <cs:fontRef idx="minor">
+      <a:schemeClr val="tx1"/>
+    </cs:fontRef>
+    <cs:spPr>
+      <a:ln w="9525" cap="flat" cmpd="sng" algn="ctr">
+        <a:solidFill>
+          <a:schemeClr val="tx1">
+            <a:lumMod val="75000"/>
+            <a:lumOff val="25000"/>
+          </a:schemeClr>
+        </a:solidFill>
+        <a:round/>
+      </a:ln>
+    </cs:spPr>
+  </cs:hiLoLine>
+  <cs:leaderLine>
+    <cs:lnRef idx="0"/>
+    <cs:fillRef idx="0"/>
+    <cs:effectRef idx="0"/>
+    <cs:fontRef idx="minor">
+      <a:schemeClr val="tx1"/>
+    </cs:fontRef>
+    <cs:spPr>
+      <a:ln w="9525" cap="flat" cmpd="sng" algn="ctr">
+        <a:solidFill>
+          <a:schemeClr val="tx1">
+            <a:lumMod val="35000"/>
+            <a:lumOff val="65000"/>
+          </a:schemeClr>
+        </a:solidFill>
+        <a:round/>
+      </a:ln>
+    </cs:spPr>
+  </cs:leaderLine>
+  <cs:legend>
+    <cs:lnRef idx="0"/>
+    <cs:fillRef idx="0"/>
+    <cs:effectRef idx="0"/>
+    <cs:fontRef idx="minor">
+      <a:schemeClr val="tx1">
+        <a:lumMod val="65000"/>
+        <a:lumOff val="35000"/>
+      </a:schemeClr>
+    </cs:fontRef>
+    <cs:defRPr sz="900" kern="1200"/>
+  </cs:legend>
+  <cs:plotArea mods="allowNoFillOverride allowNoLineOverride">
+    <cs:lnRef idx="0"/>
+    <cs:fillRef idx="0"/>
+    <cs:effectRef idx="0"/>
+    <cs:fontRef idx="minor">
+      <a:schemeClr val="tx1"/>
+    </cs:fontRef>
+  </cs:plotArea>
+  <cs:plotArea3D mods="allowNoFillOverride allowNoLineOverride">
+    <cs:lnRef idx="0"/>
+    <cs:fillRef idx="0"/>
+    <cs:effectRef idx="0"/>
+    <cs:fontRef idx="minor">
+      <a:schemeClr val="tx1"/>
+    </cs:fontRef>
+  </cs:plotArea3D>
+  <cs:seriesAxis>
+    <cs:lnRef idx="0"/>
+    <cs:fillRef idx="0"/>
+    <cs:effectRef idx="0"/>
+    <cs:fontRef idx="minor">
+      <a:schemeClr val="tx1">
+        <a:lumMod val="65000"/>
+        <a:lumOff val="35000"/>
+      </a:schemeClr>
+    </cs:fontRef>
+    <cs:defRPr sz="900" kern="1200"/>
+  </cs:seriesAxis>
+  <cs:seriesLine>
+    <cs:lnRef idx="0"/>
+    <cs:fillRef idx="0"/>
+    <cs:effectRef idx="0"/>
+    <cs:fontRef idx="minor">
+      <a:schemeClr val="tx1"/>
+    </cs:fontRef>
+    <cs:spPr>
+      <a:ln w="9525" cap="flat" cmpd="sng" algn="ctr">
+        <a:solidFill>
+          <a:schemeClr val="tx1">
+            <a:lumMod val="35000"/>
+            <a:lumOff val="65000"/>
+          </a:schemeClr>
+        </a:solidFill>
+        <a:round/>
+      </a:ln>
+    </cs:spPr>
+  </cs:seriesLine>
+  <cs:title>
+    <cs:lnRef idx="0"/>
+    <cs:fillRef idx="0"/>
+    <cs:effectRef idx="0"/>
+    <cs:fontRef idx="minor">
+      <a:schemeClr val="tx1">
+        <a:lumMod val="65000"/>
+        <a:lumOff val="35000"/>
+      </a:schemeClr>
+    </cs:fontRef>
+    <cs:defRPr sz="1400" b="0" kern="1200" spc="0" baseline="0"/>
+  </cs:title>
+  <cs:trendline>
+    <cs:lnRef idx="0">
+      <cs:styleClr val="auto"/>
+    </cs:lnRef>
+    <cs:fillRef idx="0"/>
+    <cs:effectRef idx="0"/>
+    <cs:fontRef idx="minor">
+      <a:schemeClr val="tx1"/>
+    </cs:fontRef>
+    <cs:spPr>
+      <a:ln w="19050" cap="rnd">
+        <a:solidFill>
+          <a:schemeClr val="phClr"/>
+        </a:solidFill>
+        <a:prstDash val="sysDot"/>
+      </a:ln>
+    </cs:spPr>
+  </cs:trendline>
+  <cs:trendlineLabel>
+    <cs:lnRef idx="0"/>
+    <cs:fillRef idx="0"/>
+    <cs:effectRef idx="0"/>
+    <cs:fontRef idx="minor">
+      <a:schemeClr val="tx1">
+        <a:lumMod val="65000"/>
+        <a:lumOff val="35000"/>
+      </a:schemeClr>
+    </cs:fontRef>
+    <cs:defRPr sz="900" kern="1200"/>
+  </cs:trendlineLabel>
+  <cs:upBar>
+    <cs:lnRef idx="0"/>
+    <cs:fillRef idx="0"/>
+    <cs:effectRef idx="0"/>
+    <cs:fontRef idx="minor">
+      <a:schemeClr val="dk1"/>
+    </cs:fontRef>
+    <cs:spPr>
+      <a:solidFill>
+        <a:schemeClr val="lt1"/>
+      </a:solidFill>
+      <a:ln w="9525">
+        <a:solidFill>
+          <a:schemeClr val="tx1">
+            <a:lumMod val="15000"/>
+            <a:lumOff val="85000"/>
+          </a:schemeClr>
+        </a:solidFill>
+      </a:ln>
+    </cs:spPr>
+  </cs:upBar>
+  <cs:valueAxis>
+    <cs:lnRef idx="0"/>
+    <cs:fillRef idx="0"/>
+    <cs:effectRef idx="0"/>
+    <cs:fontRef idx="minor">
+      <a:schemeClr val="tx1">
+        <a:lumMod val="65000"/>
+        <a:lumOff val="35000"/>
+      </a:schemeClr>
+    </cs:fontRef>
+    <cs:defRPr sz="900" kern="1200"/>
+  </cs:valueAxis>
+  <cs:wall>
+    <cs:lnRef idx="0"/>
+    <cs:fillRef idx="0"/>
+    <cs:effectRef idx="0"/>
+    <cs:fontRef idx="minor">
+      <a:schemeClr val="tx1"/>
+    </cs:fontRef>
+    <cs:spPr>
+      <a:noFill/>
+      <a:ln>
+        <a:noFill/>
+      </a:ln>
+    </cs:spPr>
+  </cs:wall>
+</cs:chartStyle>
+</file>
+
+<file path=ppt/comments/modernComment_105_FEEA5912.xml><?xml version="1.0" encoding="utf-8"?>
+<p188:cmLst xmlns:a="http://schemas.openxmlformats.org/drawingml/2006/main" xmlns:r="http://schemas.openxmlformats.org/officeDocument/2006/relationships" xmlns:p188="http://schemas.microsoft.com/office/powerpoint/2018/8/main">
+  <p188:cm id="{30B54127-3D58-4E94-8D15-719129280362}" authorId="{2312FB27-1B4C-E44B-C091-7573519CE921}" created="2023-03-27T14:28:33.879">
+    <pc:sldMkLst xmlns:pc="http://schemas.microsoft.com/office/powerpoint/2013/main/command">
+      <pc:docMk/>
+      <pc:sldMk cId="4276771090" sldId="261"/>
+    </pc:sldMkLst>
+    <p188:txBody>
+      <a:bodyPr/>
+      <a:lstStyle/>
+      <a:p>
+        <a:r>
+          <a:rPr lang="en-GB"/>
+          <a:t>may relegate slide to appendix</a:t>
+        </a:r>
+      </a:p>
+    </p188:txBody>
+  </p188:cm>
+</p188:cmLst>
 </file>
 
 <file path=ppt/drawings/drawing1.xml><?xml version="1.0" encoding="utf-8"?>
@@ -6930,7 +8199,7 @@
           <a:p>
             <a:fld id="{7EE13E36-9F1A-48BF-8B08-3FA708884CC2}" type="datetimeFigureOut">
               <a:rPr lang="en-GB" smtClean="0"/>
-              <a:t>24/03/2023</a:t>
+              <a:t>27/03/2023</a:t>
             </a:fld>
             <a:endParaRPr lang="en-GB"/>
           </a:p>
@@ -7587,10 +8856,42 @@
           <a:bodyPr/>
           <a:lstStyle/>
           <a:p>
-            <a:r>
-              <a:rPr lang="en-GB" dirty="0"/>
-              <a:t>London has more mothers in 35-49 age range, and since London has a lot of students, there is a lower share of 25-34 aged ones. So age does not explain this one</a:t>
-            </a:r>
+            <a:pPr marL="0" marR="0" lvl="0" indent="0" algn="l" defTabSz="914400" rtl="0" eaLnBrk="1" fontAlgn="auto" latinLnBrk="0" hangingPunct="1">
+              <a:lnSpc>
+                <a:spcPct val="100000"/>
+              </a:lnSpc>
+              <a:spcBef>
+                <a:spcPts val="0"/>
+              </a:spcBef>
+              <a:spcAft>
+                <a:spcPts val="0"/>
+              </a:spcAft>
+              <a:buClrTx/>
+              <a:buSzTx/>
+              <a:buFontTx/>
+              <a:buNone/>
+              <a:tabLst/>
+              <a:defRPr/>
+            </a:pPr>
+            <a:r>
+              <a:rPr lang="en-GB" sz="1200" i="1" u="sng" dirty="0">
+                <a:solidFill>
+                  <a:schemeClr val="bg2"/>
+                </a:solidFill>
+              </a:rPr>
+              <a:t>Base case</a:t>
+            </a:r>
+            <a:r>
+              <a:rPr lang="en-GB" sz="1200" i="1" dirty="0">
+                <a:solidFill>
+                  <a:schemeClr val="bg2"/>
+                </a:solidFill>
+              </a:rPr>
+              <a:t>: non-parent, non-London, male, white, age 25-34, youngest child aged &lt;2yrs, single, no work-limiting health, no children</a:t>
+            </a:r>
+          </a:p>
+          <a:p>
+            <a:endParaRPr lang="en-GB" dirty="0"/>
           </a:p>
         </p:txBody>
       </p:sp>
@@ -7611,7 +8912,94 @@
           <a:p>
             <a:fld id="{AB494F1A-23BD-4085-BE21-19A50FF7AFFF}" type="slidenum">
               <a:rPr lang="en-GB" smtClean="0"/>
-              <a:t>6</a:t>
+              <a:t>8</a:t>
+            </a:fld>
+            <a:endParaRPr lang="en-GB"/>
+          </a:p>
+        </p:txBody>
+      </p:sp>
+    </p:spTree>
+    <p:extLst>
+      <p:ext uri="{BB962C8B-B14F-4D97-AF65-F5344CB8AC3E}">
+        <p14:creationId xmlns:p14="http://schemas.microsoft.com/office/powerpoint/2010/main" val="299268165"/>
+      </p:ext>
+    </p:extLst>
+  </p:cSld>
+  <p:clrMapOvr>
+    <a:masterClrMapping/>
+  </p:clrMapOvr>
+</p:notes>
+</file>
+
+<file path=ppt/notesSlides/notesSlide6.xml><?xml version="1.0" encoding="utf-8"?>
+<p:notes xmlns:a="http://schemas.openxmlformats.org/drawingml/2006/main" xmlns:r="http://schemas.openxmlformats.org/officeDocument/2006/relationships" xmlns:p="http://schemas.openxmlformats.org/presentationml/2006/main">
+  <p:cSld>
+    <p:spTree>
+      <p:nvGrpSpPr>
+        <p:cNvPr id="1" name=""/>
+        <p:cNvGrpSpPr/>
+        <p:nvPr/>
+      </p:nvGrpSpPr>
+      <p:grpSpPr>
+        <a:xfrm>
+          <a:off x="0" y="0"/>
+          <a:ext cx="0" cy="0"/>
+          <a:chOff x="0" y="0"/>
+          <a:chExt cx="0" cy="0"/>
+        </a:xfrm>
+      </p:grpSpPr>
+      <p:sp>
+        <p:nvSpPr>
+          <p:cNvPr id="2" name="Slide Image Placeholder 1"/>
+          <p:cNvSpPr>
+            <a:spLocks noGrp="1" noRot="1" noChangeAspect="1"/>
+          </p:cNvSpPr>
+          <p:nvPr>
+            <p:ph type="sldImg"/>
+          </p:nvPr>
+        </p:nvSpPr>
+        <p:spPr/>
+      </p:sp>
+      <p:sp>
+        <p:nvSpPr>
+          <p:cNvPr id="3" name="Notes Placeholder 2"/>
+          <p:cNvSpPr>
+            <a:spLocks noGrp="1"/>
+          </p:cNvSpPr>
+          <p:nvPr>
+            <p:ph type="body" idx="1"/>
+          </p:nvPr>
+        </p:nvSpPr>
+        <p:spPr/>
+        <p:txBody>
+          <a:bodyPr/>
+          <a:lstStyle/>
+          <a:p>
+            <a:r>
+              <a:rPr lang="en-GB" dirty="0"/>
+              <a:t>London has more mothers in 35-49 age range, and since London has a lot of students, there is a lower share of 25-34 aged ones. So age does not explain this one</a:t>
+            </a:r>
+          </a:p>
+        </p:txBody>
+      </p:sp>
+      <p:sp>
+        <p:nvSpPr>
+          <p:cNvPr id="4" name="Slide Number Placeholder 3"/>
+          <p:cNvSpPr>
+            <a:spLocks noGrp="1"/>
+          </p:cNvSpPr>
+          <p:nvPr>
+            <p:ph type="sldNum" sz="quarter" idx="5"/>
+          </p:nvPr>
+        </p:nvSpPr>
+        <p:spPr/>
+        <p:txBody>
+          <a:bodyPr/>
+          <a:lstStyle/>
+          <a:p>
+            <a:fld id="{AB494F1A-23BD-4085-BE21-19A50FF7AFFF}" type="slidenum">
+              <a:rPr lang="en-GB" smtClean="0"/>
+              <a:t>10</a:t>
             </a:fld>
             <a:endParaRPr lang="en-GB"/>
           </a:p>
@@ -13452,6 +14840,95 @@
 </p:sld>
 </file>
 
+<file path=ppt/slides/slide10.xml><?xml version="1.0" encoding="utf-8"?>
+<p:sld xmlns:a="http://schemas.openxmlformats.org/drawingml/2006/main" xmlns:r="http://schemas.openxmlformats.org/officeDocument/2006/relationships" xmlns:p="http://schemas.openxmlformats.org/presentationml/2006/main">
+  <p:cSld>
+    <p:spTree>
+      <p:nvGrpSpPr>
+        <p:cNvPr id="1" name=""/>
+        <p:cNvGrpSpPr/>
+        <p:nvPr/>
+      </p:nvGrpSpPr>
+      <p:grpSpPr>
+        <a:xfrm>
+          <a:off x="0" y="0"/>
+          <a:ext cx="0" cy="0"/>
+          <a:chOff x="0" y="0"/>
+          <a:chExt cx="0" cy="0"/>
+        </a:xfrm>
+      </p:grpSpPr>
+      <p:sp>
+        <p:nvSpPr>
+          <p:cNvPr id="2" name="Title 1">
+            <a:extLst>
+              <a:ext uri="{FF2B5EF4-FFF2-40B4-BE49-F238E27FC236}">
+                <a16:creationId xmlns:a16="http://schemas.microsoft.com/office/drawing/2014/main" id="{434F7A33-9C21-4E27-B1D0-5B587E013D60}"/>
+              </a:ext>
+            </a:extLst>
+          </p:cNvPr>
+          <p:cNvSpPr>
+            <a:spLocks noGrp="1"/>
+          </p:cNvSpPr>
+          <p:nvPr>
+            <p:ph type="title"/>
+          </p:nvPr>
+        </p:nvSpPr>
+        <p:spPr/>
+        <p:txBody>
+          <a:bodyPr/>
+          <a:lstStyle/>
+          <a:p>
+            <a:r>
+              <a:rPr lang="en-GB" dirty="0"/>
+              <a:t>Yet, London has same share of working-age mothers as UK average</a:t>
+            </a:r>
+          </a:p>
+        </p:txBody>
+      </p:sp>
+      <p:graphicFrame>
+        <p:nvGraphicFramePr>
+          <p:cNvPr id="13" name="Content Placeholder 12">
+            <a:extLst>
+              <a:ext uri="{FF2B5EF4-FFF2-40B4-BE49-F238E27FC236}">
+                <a16:creationId xmlns:a16="http://schemas.microsoft.com/office/drawing/2014/main" id="{155F2C6E-3988-4394-A53E-48BE8D1FF6DB}"/>
+              </a:ext>
+            </a:extLst>
+          </p:cNvPr>
+          <p:cNvGraphicFramePr>
+            <a:graphicFrameLocks noGrp="1"/>
+          </p:cNvGraphicFramePr>
+          <p:nvPr>
+            <p:ph idx="1"/>
+          </p:nvPr>
+        </p:nvGraphicFramePr>
+        <p:xfrm>
+          <a:off x="838200" y="1825625"/>
+          <a:ext cx="10515600" cy="4351338"/>
+        </p:xfrm>
+        <a:graphic>
+          <a:graphicData uri="http://schemas.openxmlformats.org/drawingml/2006/chart">
+            <c:chart xmlns:c="http://schemas.openxmlformats.org/drawingml/2006/chart" xmlns:r="http://schemas.openxmlformats.org/officeDocument/2006/relationships" r:id="rId4"/>
+          </a:graphicData>
+        </a:graphic>
+      </p:graphicFrame>
+    </p:spTree>
+    <p:extLst>
+      <p:ext uri="{BB962C8B-B14F-4D97-AF65-F5344CB8AC3E}">
+        <p14:creationId xmlns:p14="http://schemas.microsoft.com/office/powerpoint/2010/main" val="4276771090"/>
+      </p:ext>
+    </p:extLst>
+  </p:cSld>
+  <p:clrMapOvr>
+    <a:masterClrMapping/>
+  </p:clrMapOvr>
+  <p:extLst>
+    <p:ext uri="{6950BFC3-D8DA-4A85-94F7-54DA5524770B}">
+      <p188:commentRel xmlns:p188="http://schemas.microsoft.com/office/powerpoint/2018/8/main" r:id="rId3"/>
+    </p:ext>
+  </p:extLst>
+</p:sld>
+</file>
+
 <file path=ppt/slides/slide2.xml><?xml version="1.0" encoding="utf-8"?>
 <p:sld xmlns:a="http://schemas.openxmlformats.org/drawingml/2006/main" xmlns:r="http://schemas.openxmlformats.org/officeDocument/2006/relationships" xmlns:p="http://schemas.openxmlformats.org/presentationml/2006/main">
   <p:cSld>
@@ -13825,7 +15302,7 @@
           <p:cNvPr id="2" name="Title 1">
             <a:extLst>
               <a:ext uri="{FF2B5EF4-FFF2-40B4-BE49-F238E27FC236}">
-                <a16:creationId xmlns:a16="http://schemas.microsoft.com/office/drawing/2014/main" id="{434F7A33-9C21-4E27-B1D0-5B587E013D60}"/>
+                <a16:creationId xmlns:a16="http://schemas.microsoft.com/office/drawing/2014/main" id="{5E6A33A0-478F-40BC-B11F-72605AAF3B23}"/>
               </a:ext>
             </a:extLst>
           </p:cNvPr>
@@ -13843,17 +15320,17 @@
           <a:p>
             <a:r>
               <a:rPr lang="en-GB" dirty="0"/>
-              <a:t>Yet, London has same share of working-age mothers as UK average</a:t>
+              <a:t>… and it has persisted for some time</a:t>
             </a:r>
           </a:p>
         </p:txBody>
       </p:sp>
       <p:graphicFrame>
         <p:nvGraphicFramePr>
-          <p:cNvPr id="13" name="Content Placeholder 12">
+          <p:cNvPr id="4" name="Content Placeholder 3">
             <a:extLst>
               <a:ext uri="{FF2B5EF4-FFF2-40B4-BE49-F238E27FC236}">
-                <a16:creationId xmlns:a16="http://schemas.microsoft.com/office/drawing/2014/main" id="{155F2C6E-3988-4394-A53E-48BE8D1FF6DB}"/>
+                <a16:creationId xmlns:a16="http://schemas.microsoft.com/office/drawing/2014/main" id="{87574711-08DA-4ED8-802F-1C972E07578F}"/>
               </a:ext>
             </a:extLst>
           </p:cNvPr>
@@ -13862,6 +15339,11 @@
           </p:cNvGraphicFramePr>
           <p:nvPr>
             <p:ph idx="1"/>
+            <p:extLst>
+              <p:ext uri="{D42A27DB-BD31-4B8C-83A1-F6EECF244321}">
+                <p14:modId xmlns:p14="http://schemas.microsoft.com/office/powerpoint/2010/main" val="3571195815"/>
+              </p:ext>
+            </p:extLst>
           </p:nvPr>
         </p:nvGraphicFramePr>
         <p:xfrm>
@@ -13870,14 +15352,14 @@
         </p:xfrm>
         <a:graphic>
           <a:graphicData uri="http://schemas.openxmlformats.org/drawingml/2006/chart">
-            <c:chart xmlns:c="http://schemas.openxmlformats.org/drawingml/2006/chart" xmlns:r="http://schemas.openxmlformats.org/officeDocument/2006/relationships" r:id="rId3"/>
+            <c:chart xmlns:c="http://schemas.openxmlformats.org/drawingml/2006/chart" xmlns:r="http://schemas.openxmlformats.org/officeDocument/2006/relationships" r:id="rId2"/>
           </a:graphicData>
         </a:graphic>
       </p:graphicFrame>
     </p:spTree>
     <p:extLst>
       <p:ext uri="{BB962C8B-B14F-4D97-AF65-F5344CB8AC3E}">
-        <p14:creationId xmlns:p14="http://schemas.microsoft.com/office/powerpoint/2010/main" val="4276771090"/>
+        <p14:creationId xmlns:p14="http://schemas.microsoft.com/office/powerpoint/2010/main" val="1207265478"/>
       </p:ext>
     </p:extLst>
   </p:cSld>
@@ -13888,6 +15370,410 @@
 </file>
 
 <file path=ppt/slides/slide7.xml><?xml version="1.0" encoding="utf-8"?>
+<p:sld xmlns:a="http://schemas.openxmlformats.org/drawingml/2006/main" xmlns:r="http://schemas.openxmlformats.org/officeDocument/2006/relationships" xmlns:p="http://schemas.openxmlformats.org/presentationml/2006/main">
+  <p:cSld>
+    <p:spTree>
+      <p:nvGrpSpPr>
+        <p:cNvPr id="1" name=""/>
+        <p:cNvGrpSpPr/>
+        <p:nvPr/>
+      </p:nvGrpSpPr>
+      <p:grpSpPr>
+        <a:xfrm>
+          <a:off x="0" y="0"/>
+          <a:ext cx="0" cy="0"/>
+          <a:chOff x="0" y="0"/>
+          <a:chExt cx="0" cy="0"/>
+        </a:xfrm>
+      </p:grpSpPr>
+      <p:sp>
+        <p:nvSpPr>
+          <p:cNvPr id="2" name="Title 1">
+            <a:extLst>
+              <a:ext uri="{FF2B5EF4-FFF2-40B4-BE49-F238E27FC236}">
+                <a16:creationId xmlns:a16="http://schemas.microsoft.com/office/drawing/2014/main" id="{6B5A66A8-5F84-451D-8500-9A009BB7A558}"/>
+              </a:ext>
+            </a:extLst>
+          </p:cNvPr>
+          <p:cNvSpPr>
+            <a:spLocks noGrp="1"/>
+          </p:cNvSpPr>
+          <p:nvPr>
+            <p:ph type="title"/>
+          </p:nvPr>
+        </p:nvSpPr>
+        <p:spPr/>
+        <p:txBody>
+          <a:bodyPr/>
+          <a:lstStyle/>
+          <a:p>
+            <a:r>
+              <a:rPr lang="en-GB" dirty="0"/>
+              <a:t>Regressions to find underlying reasons</a:t>
+            </a:r>
+          </a:p>
+        </p:txBody>
+      </p:sp>
+      <mc:AlternateContent xmlns:mc="http://schemas.openxmlformats.org/markup-compatibility/2006">
+        <mc:Choice xmlns:a14="http://schemas.microsoft.com/office/drawing/2010/main" Requires="a14">
+          <p:sp>
+            <p:nvSpPr>
+              <p:cNvPr id="3" name="Content Placeholder 2">
+                <a:extLst>
+                  <a:ext uri="{FF2B5EF4-FFF2-40B4-BE49-F238E27FC236}">
+                    <a16:creationId xmlns:a16="http://schemas.microsoft.com/office/drawing/2014/main" id="{295EF4DC-715E-4829-9CB0-F56D71F6EA82}"/>
+                  </a:ext>
+                </a:extLst>
+              </p:cNvPr>
+              <p:cNvSpPr>
+                <a:spLocks noGrp="1"/>
+              </p:cNvSpPr>
+              <p:nvPr>
+                <p:ph idx="1"/>
+              </p:nvPr>
+            </p:nvSpPr>
+            <p:spPr/>
+            <p:txBody>
+              <a:bodyPr>
+                <a:normAutofit/>
+              </a:bodyPr>
+              <a:lstStyle/>
+              <a:p>
+                <a:pPr marL="0" indent="0">
+                  <a:buNone/>
+                </a:pPr>
+                <a:r>
+                  <a:rPr lang="en-GB" sz="2400" dirty="0"/>
+                  <a:t>Realistically, there should be an underlying reason why the gap exists rather than being intrinsically linked to London.</a:t>
+                </a:r>
+              </a:p>
+              <a:p>
+                <a:pPr marL="0" indent="0">
+                  <a:buNone/>
+                </a:pPr>
+                <a:endParaRPr lang="en-GB" sz="2400" dirty="0"/>
+              </a:p>
+              <a:p>
+                <a:pPr marL="0" indent="0">
+                  <a:buNone/>
+                </a:pPr>
+                <a:r>
+                  <a:rPr lang="en-GB" sz="2400" dirty="0"/>
+                  <a:t>We use the following simple model to explore possible explanations, where the </a:t>
+                </a:r>
+                <a:r>
+                  <a:rPr lang="en-GB" sz="2400" dirty="0">
+                    <a:solidFill>
+                      <a:srgbClr val="FF0000"/>
+                    </a:solidFill>
+                  </a:rPr>
+                  <a:t>coefficient of interest </a:t>
+                </a:r>
+                <a:r>
+                  <a:rPr lang="en-GB" sz="2400" dirty="0"/>
+                  <a:t>represents the gap:</a:t>
+                </a:r>
+              </a:p>
+              <a:p>
+                <a:pPr marL="0" indent="0">
+                  <a:buNone/>
+                </a:pPr>
+                <a:endParaRPr lang="en-GB" sz="2400" b="0" i="1" dirty="0">
+                  <a:latin typeface="Cambria Math" panose="02040503050406030204" pitchFamily="18" charset="0"/>
+                </a:endParaRPr>
+              </a:p>
+              <a:p>
+                <a:pPr marL="0" indent="0">
+                  <a:buNone/>
+                </a:pPr>
+                <a14:m>
+                  <m:oMathPara xmlns:m="http://schemas.openxmlformats.org/officeDocument/2006/math">
+                    <m:oMathParaPr>
+                      <m:jc m:val="centerGroup"/>
+                    </m:oMathParaPr>
+                    <m:oMath xmlns:m="http://schemas.openxmlformats.org/officeDocument/2006/math">
+                      <m:r>
+                        <a:rPr lang="en-GB" sz="2400" b="0" i="1" smtClean="0">
+                          <a:latin typeface="Cambria Math" panose="02040503050406030204" pitchFamily="18" charset="0"/>
+                        </a:rPr>
+                        <m:t>𝐸𝑚𝑝𝑙𝑜𝑦</m:t>
+                      </m:r>
+                      <m:r>
+                        <a:rPr lang="en-GB" sz="2400" b="0" i="1" smtClean="0">
+                          <a:latin typeface="Cambria Math" panose="02040503050406030204" pitchFamily="18" charset="0"/>
+                        </a:rPr>
+                        <m:t>=</m:t>
+                      </m:r>
+                      <m:sSub>
+                        <m:sSubPr>
+                          <m:ctrlPr>
+                            <a:rPr lang="en-GB" sz="2400" b="0" i="1" smtClean="0">
+                              <a:latin typeface="Cambria Math" panose="02040503050406030204" pitchFamily="18" charset="0"/>
+                            </a:rPr>
+                          </m:ctrlPr>
+                        </m:sSubPr>
+                        <m:e>
+                          <m:r>
+                            <a:rPr lang="en-GB" sz="2400" b="0" i="1" smtClean="0">
+                              <a:latin typeface="Cambria Math" panose="02040503050406030204" pitchFamily="18" charset="0"/>
+                            </a:rPr>
+                            <m:t>𝛽</m:t>
+                          </m:r>
+                        </m:e>
+                        <m:sub>
+                          <m:r>
+                            <a:rPr lang="en-GB" sz="2400" b="0" i="1" smtClean="0">
+                              <a:latin typeface="Cambria Math" panose="02040503050406030204" pitchFamily="18" charset="0"/>
+                            </a:rPr>
+                            <m:t>1</m:t>
+                          </m:r>
+                        </m:sub>
+                      </m:sSub>
+                      <m:r>
+                        <a:rPr lang="en-GB" sz="2400" b="0" i="1" smtClean="0">
+                          <a:latin typeface="Cambria Math" panose="02040503050406030204" pitchFamily="18" charset="0"/>
+                          <a:ea typeface="Cambria Math" panose="02040503050406030204" pitchFamily="18" charset="0"/>
+                        </a:rPr>
+                        <m:t>𝑃𝑎𝑟𝑒𝑛𝑡</m:t>
+                      </m:r>
+                      <m:r>
+                        <a:rPr lang="en-GB" sz="2400" b="0" i="1" smtClean="0">
+                          <a:latin typeface="Cambria Math" panose="02040503050406030204" pitchFamily="18" charset="0"/>
+                          <a:ea typeface="Cambria Math" panose="02040503050406030204" pitchFamily="18" charset="0"/>
+                        </a:rPr>
+                        <m:t>+</m:t>
+                      </m:r>
+                      <m:sSub>
+                        <m:sSubPr>
+                          <m:ctrlPr>
+                            <a:rPr lang="en-GB" sz="2400" i="1">
+                              <a:latin typeface="Cambria Math" panose="02040503050406030204" pitchFamily="18" charset="0"/>
+                            </a:rPr>
+                          </m:ctrlPr>
+                        </m:sSubPr>
+                        <m:e>
+                          <m:r>
+                            <a:rPr lang="en-GB" sz="2400" i="1">
+                              <a:latin typeface="Cambria Math" panose="02040503050406030204" pitchFamily="18" charset="0"/>
+                            </a:rPr>
+                            <m:t>𝛽</m:t>
+                          </m:r>
+                        </m:e>
+                        <m:sub>
+                          <m:r>
+                            <a:rPr lang="en-GB" sz="2400" b="0" i="1" smtClean="0">
+                              <a:latin typeface="Cambria Math" panose="02040503050406030204" pitchFamily="18" charset="0"/>
+                            </a:rPr>
+                            <m:t>2</m:t>
+                          </m:r>
+                        </m:sub>
+                      </m:sSub>
+                      <m:r>
+                        <a:rPr lang="en-GB" sz="2400" b="0" i="1" smtClean="0">
+                          <a:latin typeface="Cambria Math" panose="02040503050406030204" pitchFamily="18" charset="0"/>
+                          <a:ea typeface="Cambria Math" panose="02040503050406030204" pitchFamily="18" charset="0"/>
+                        </a:rPr>
+                        <m:t>𝐿𝑜𝑛𝑑𝑜𝑛𝑒𝑟</m:t>
+                      </m:r>
+                      <m:r>
+                        <a:rPr lang="en-GB" sz="2400" b="0" i="0" smtClean="0">
+                          <a:latin typeface="Cambria Math" panose="02040503050406030204" pitchFamily="18" charset="0"/>
+                          <a:ea typeface="Cambria Math" panose="02040503050406030204" pitchFamily="18" charset="0"/>
+                        </a:rPr>
+                        <m:t>+</m:t>
+                      </m:r>
+                      <m:sSub>
+                        <m:sSubPr>
+                          <m:ctrlPr>
+                            <a:rPr lang="en-GB" sz="2400" b="1" i="1" smtClean="0">
+                              <a:solidFill>
+                                <a:srgbClr val="FF0000"/>
+                              </a:solidFill>
+                              <a:latin typeface="Cambria Math" panose="02040503050406030204" pitchFamily="18" charset="0"/>
+                            </a:rPr>
+                          </m:ctrlPr>
+                        </m:sSubPr>
+                        <m:e>
+                          <m:r>
+                            <a:rPr lang="en-GB" sz="2400" b="1" i="1">
+                              <a:solidFill>
+                                <a:srgbClr val="FF0000"/>
+                              </a:solidFill>
+                              <a:latin typeface="Cambria Math" panose="02040503050406030204" pitchFamily="18" charset="0"/>
+                            </a:rPr>
+                            <m:t>𝜷</m:t>
+                          </m:r>
+                        </m:e>
+                        <m:sub>
+                          <m:r>
+                            <a:rPr lang="en-GB" sz="2400" b="1" i="1" smtClean="0">
+                              <a:solidFill>
+                                <a:srgbClr val="FF0000"/>
+                              </a:solidFill>
+                              <a:latin typeface="Cambria Math" panose="02040503050406030204" pitchFamily="18" charset="0"/>
+                            </a:rPr>
+                            <m:t>𝟑</m:t>
+                          </m:r>
+                        </m:sub>
+                      </m:sSub>
+                      <m:r>
+                        <a:rPr lang="en-GB" sz="2400" i="1">
+                          <a:latin typeface="Cambria Math" panose="02040503050406030204" pitchFamily="18" charset="0"/>
+                          <a:ea typeface="Cambria Math" panose="02040503050406030204" pitchFamily="18" charset="0"/>
+                        </a:rPr>
+                        <m:t>𝑃𝑎𝑟𝑒𝑛𝑡</m:t>
+                      </m:r>
+                      <m:r>
+                        <a:rPr lang="en-GB" sz="2400" b="0" i="1" smtClean="0">
+                          <a:latin typeface="Cambria Math" panose="02040503050406030204" pitchFamily="18" charset="0"/>
+                          <a:ea typeface="Cambria Math" panose="02040503050406030204" pitchFamily="18" charset="0"/>
+                        </a:rPr>
+                        <m:t>∗</m:t>
+                      </m:r>
+                      <m:r>
+                        <a:rPr lang="en-GB" sz="2400" b="0" i="1" smtClean="0">
+                          <a:latin typeface="Cambria Math" panose="02040503050406030204" pitchFamily="18" charset="0"/>
+                          <a:ea typeface="Cambria Math" panose="02040503050406030204" pitchFamily="18" charset="0"/>
+                        </a:rPr>
+                        <m:t>𝐿𝑜𝑛𝑑𝑜𝑛𝑒𝑟</m:t>
+                      </m:r>
+                      <m:r>
+                        <a:rPr lang="en-GB" sz="2400" b="0" i="1" smtClean="0">
+                          <a:latin typeface="Cambria Math" panose="02040503050406030204" pitchFamily="18" charset="0"/>
+                          <a:ea typeface="Cambria Math" panose="02040503050406030204" pitchFamily="18" charset="0"/>
+                        </a:rPr>
+                        <m:t>+</m:t>
+                      </m:r>
+                      <m:r>
+                        <a:rPr lang="en-GB" sz="2400" b="0" i="1" smtClean="0">
+                          <a:latin typeface="Cambria Math" panose="02040503050406030204" pitchFamily="18" charset="0"/>
+                          <a:ea typeface="Cambria Math" panose="02040503050406030204" pitchFamily="18" charset="0"/>
+                        </a:rPr>
+                        <m:t>𝑋</m:t>
+                      </m:r>
+                      <m:r>
+                        <a:rPr lang="en-GB" sz="2400" b="0" i="1" smtClean="0">
+                          <a:latin typeface="Cambria Math" panose="02040503050406030204" pitchFamily="18" charset="0"/>
+                          <a:ea typeface="Cambria Math" panose="02040503050406030204" pitchFamily="18" charset="0"/>
+                        </a:rPr>
+                        <m:t>𝛽</m:t>
+                      </m:r>
+                    </m:oMath>
+                  </m:oMathPara>
+                </a14:m>
+                <a:endParaRPr lang="en-GB" sz="2400" dirty="0"/>
+              </a:p>
+              <a:p>
+                <a:pPr marL="0" indent="0">
+                  <a:buNone/>
+                </a:pPr>
+                <a:endParaRPr lang="en-GB" sz="2400" dirty="0"/>
+              </a:p>
+              <a:p>
+                <a:pPr marL="0" indent="0">
+                  <a:buNone/>
+                </a:pPr>
+                <a:r>
+                  <a:rPr lang="en-GB" sz="2400" dirty="0"/>
+                  <a:t>We do not claim to find causal links, but rather look for a demographic characteristic/composition effect explaining the gap.</a:t>
+                </a:r>
+              </a:p>
+            </p:txBody>
+          </p:sp>
+        </mc:Choice>
+        <mc:Fallback>
+          <p:sp>
+            <p:nvSpPr>
+              <p:cNvPr id="3" name="Content Placeholder 2">
+                <a:extLst>
+                  <a:ext uri="{FF2B5EF4-FFF2-40B4-BE49-F238E27FC236}">
+                    <a16:creationId xmlns:a16="http://schemas.microsoft.com/office/drawing/2014/main" id="{295EF4DC-715E-4829-9CB0-F56D71F6EA82}"/>
+                  </a:ext>
+                </a:extLst>
+              </p:cNvPr>
+              <p:cNvSpPr>
+                <a:spLocks noGrp="1" noRot="1" noChangeAspect="1" noMove="1" noResize="1" noEditPoints="1" noAdjustHandles="1" noChangeArrowheads="1" noChangeShapeType="1" noTextEdit="1"/>
+              </p:cNvSpPr>
+              <p:nvPr>
+                <p:ph idx="1"/>
+              </p:nvPr>
+            </p:nvSpPr>
+            <p:spPr>
+              <a:blipFill>
+                <a:blip r:embed="rId2"/>
+                <a:stretch>
+                  <a:fillRect l="-928" t="-1821" r="-1101"/>
+                </a:stretch>
+              </a:blipFill>
+            </p:spPr>
+            <p:txBody>
+              <a:bodyPr/>
+              <a:lstStyle/>
+              <a:p>
+                <a:r>
+                  <a:rPr lang="en-GB">
+                    <a:noFill/>
+                  </a:rPr>
+                  <a:t> </a:t>
+                </a:r>
+              </a:p>
+            </p:txBody>
+          </p:sp>
+        </mc:Fallback>
+      </mc:AlternateContent>
+      <p:sp>
+        <p:nvSpPr>
+          <p:cNvPr id="4" name="TextBox 3">
+            <a:extLst>
+              <a:ext uri="{FF2B5EF4-FFF2-40B4-BE49-F238E27FC236}">
+                <a16:creationId xmlns:a16="http://schemas.microsoft.com/office/drawing/2014/main" id="{BE0CE882-98E4-4C00-8CFC-8C55291CACD9}"/>
+              </a:ext>
+            </a:extLst>
+          </p:cNvPr>
+          <p:cNvSpPr txBox="1"/>
+          <p:nvPr/>
+        </p:nvSpPr>
+        <p:spPr>
+          <a:xfrm>
+            <a:off x="681487" y="6176963"/>
+            <a:ext cx="9057736" cy="307777"/>
+          </a:xfrm>
+          <a:prstGeom prst="rect">
+            <a:avLst/>
+          </a:prstGeom>
+          <a:noFill/>
+        </p:spPr>
+        <p:txBody>
+          <a:bodyPr wrap="square" rtlCol="0">
+            <a:spAutoFit/>
+          </a:bodyPr>
+          <a:lstStyle/>
+          <a:p>
+            <a:r>
+              <a:rPr lang="en-GB" sz="1400" i="1" dirty="0">
+                <a:solidFill>
+                  <a:schemeClr val="bg2"/>
+                </a:solidFill>
+              </a:rPr>
+              <a:t>Note: regression run on sample of women only.</a:t>
+            </a:r>
+          </a:p>
+        </p:txBody>
+      </p:sp>
+    </p:spTree>
+    <p:extLst>
+      <p:ext uri="{BB962C8B-B14F-4D97-AF65-F5344CB8AC3E}">
+        <p14:creationId xmlns:p14="http://schemas.microsoft.com/office/powerpoint/2010/main" val="577115124"/>
+      </p:ext>
+    </p:extLst>
+  </p:cSld>
+  <p:clrMapOvr>
+    <a:masterClrMapping/>
+  </p:clrMapOvr>
+</p:sld>
+</file>
+
+<file path=ppt/slides/slide8.xml><?xml version="1.0" encoding="utf-8"?>
 <p:sld xmlns:a="http://schemas.openxmlformats.org/drawingml/2006/main" xmlns:r="http://schemas.openxmlformats.org/officeDocument/2006/relationships" xmlns:p="http://schemas.openxmlformats.org/presentationml/2006/main">
   <p:cSld>
     <p:spTree>
@@ -13932,12 +15818,106 @@
           </a:p>
         </p:txBody>
       </p:sp>
+      <p:sp>
+        <p:nvSpPr>
+          <p:cNvPr id="7" name="Content Placeholder 6">
+            <a:extLst>
+              <a:ext uri="{FF2B5EF4-FFF2-40B4-BE49-F238E27FC236}">
+                <a16:creationId xmlns:a16="http://schemas.microsoft.com/office/drawing/2014/main" id="{CB3BC103-A57A-496F-871F-08D5FBC67906}"/>
+              </a:ext>
+            </a:extLst>
+          </p:cNvPr>
+          <p:cNvSpPr>
+            <a:spLocks noGrp="1"/>
+          </p:cNvSpPr>
+          <p:nvPr>
+            <p:ph sz="half" idx="2"/>
+          </p:nvPr>
+        </p:nvSpPr>
+        <p:spPr/>
+        <p:txBody>
+          <a:bodyPr>
+            <a:normAutofit fontScale="92500" lnSpcReduction="10000"/>
+          </a:bodyPr>
+          <a:lstStyle/>
+          <a:p>
+            <a:r>
+              <a:rPr lang="en-GB" dirty="0"/>
+              <a:t>We regress employment on personal and family characteristics for women</a:t>
+            </a:r>
+          </a:p>
+          <a:p>
+            <a:r>
+              <a:rPr lang="en-GB" dirty="0"/>
+              <a:t>Each model introduces a single additional covariate</a:t>
+            </a:r>
+          </a:p>
+          <a:p>
+            <a:r>
+              <a:rPr lang="en-GB" dirty="0"/>
+              <a:t>Point estimates and 95% CI shown in chart for coefficient of interest</a:t>
+            </a:r>
+          </a:p>
+          <a:p>
+            <a:r>
+              <a:rPr lang="en-GB" dirty="0"/>
+              <a:t>The gap remains in all models except when </a:t>
+            </a:r>
+            <a:r>
+              <a:rPr lang="en-GB" u="sng" dirty="0"/>
+              <a:t>including work-limiting health issues </a:t>
+            </a:r>
+          </a:p>
+          <a:p>
+            <a:endParaRPr lang="en-GB" dirty="0"/>
+          </a:p>
+        </p:txBody>
+      </p:sp>
+      <p:sp>
+        <p:nvSpPr>
+          <p:cNvPr id="10" name="TextBox 9">
+            <a:extLst>
+              <a:ext uri="{FF2B5EF4-FFF2-40B4-BE49-F238E27FC236}">
+                <a16:creationId xmlns:a16="http://schemas.microsoft.com/office/drawing/2014/main" id="{DDDEC227-68C2-46AC-81A4-368F37020BAA}"/>
+              </a:ext>
+            </a:extLst>
+          </p:cNvPr>
+          <p:cNvSpPr txBox="1"/>
+          <p:nvPr/>
+        </p:nvSpPr>
+        <p:spPr>
+          <a:xfrm>
+            <a:off x="681487" y="6176963"/>
+            <a:ext cx="9057736" cy="307777"/>
+          </a:xfrm>
+          <a:prstGeom prst="rect">
+            <a:avLst/>
+          </a:prstGeom>
+          <a:noFill/>
+        </p:spPr>
+        <p:txBody>
+          <a:bodyPr wrap="square" rtlCol="0">
+            <a:spAutoFit/>
+          </a:bodyPr>
+          <a:lstStyle/>
+          <a:p>
+            <a:r>
+              <a:rPr lang="en-GB" sz="1400" i="1" dirty="0">
+                <a:solidFill>
+                  <a:schemeClr val="bg2"/>
+                </a:solidFill>
+              </a:rPr>
+              <a:t>Note: other covariate coefficients not shown.</a:t>
+            </a:r>
+          </a:p>
+        </p:txBody>
+      </p:sp>
       <p:pic>
         <p:nvPicPr>
-          <p:cNvPr id="9" name="Content Placeholder 8" descr="Chart&#10;&#10;Description automatically generated">
+          <p:cNvPr id="14" name="Content Placeholder 13" descr="Chart, diagram&#10;&#10;Description automatically generated">
             <a:extLst>
               <a:ext uri="{FF2B5EF4-FFF2-40B4-BE49-F238E27FC236}">
-                <a16:creationId xmlns:a16="http://schemas.microsoft.com/office/drawing/2014/main" id="{3A4C81B1-BA34-40E8-967F-6DB90BD0DD16}"/>
+                <a16:creationId xmlns:a16="http://schemas.microsoft.com/office/drawing/2014/main" id="{A4364476-10E1-4AA9-B79D-11FB65D3F604}"/>
               </a:ext>
             </a:extLst>
           </p:cNvPr>
@@ -13949,7 +15929,7 @@
           </p:nvPr>
         </p:nvPicPr>
         <p:blipFill>
-          <a:blip r:embed="rId2">
+          <a:blip r:embed="rId3">
             <a:extLst>
               <a:ext uri="{28A0092B-C50C-407E-A947-70E740481C1C}">
                 <a14:useLocalDpi xmlns:a14="http://schemas.microsoft.com/office/drawing/2010/main" val="0"/>
@@ -13969,106 +15949,6 @@
       </p:pic>
       <p:sp>
         <p:nvSpPr>
-          <p:cNvPr id="7" name="Content Placeholder 6">
-            <a:extLst>
-              <a:ext uri="{FF2B5EF4-FFF2-40B4-BE49-F238E27FC236}">
-                <a16:creationId xmlns:a16="http://schemas.microsoft.com/office/drawing/2014/main" id="{CB3BC103-A57A-496F-871F-08D5FBC67906}"/>
-              </a:ext>
-            </a:extLst>
-          </p:cNvPr>
-          <p:cNvSpPr>
-            <a:spLocks noGrp="1"/>
-          </p:cNvSpPr>
-          <p:nvPr>
-            <p:ph sz="half" idx="2"/>
-          </p:nvPr>
-        </p:nvSpPr>
-        <p:spPr/>
-        <p:txBody>
-          <a:bodyPr/>
-          <a:lstStyle/>
-          <a:p>
-            <a:r>
-              <a:rPr lang="en-GB" dirty="0"/>
-              <a:t>We regress employment on personal and family characteristics</a:t>
-            </a:r>
-          </a:p>
-          <a:p>
-            <a:r>
-              <a:rPr lang="en-GB" dirty="0"/>
-              <a:t>The estimate is relative to base case of model (see footnote)</a:t>
-            </a:r>
-          </a:p>
-          <a:p>
-            <a:r>
-              <a:rPr lang="en-GB" dirty="0"/>
-              <a:t>The female employment gap remains in all models except including work-limiting health issues</a:t>
-            </a:r>
-          </a:p>
-          <a:p>
-            <a:endParaRPr lang="en-GB" dirty="0"/>
-          </a:p>
-        </p:txBody>
-      </p:sp>
-      <p:sp>
-        <p:nvSpPr>
-          <p:cNvPr id="10" name="TextBox 9">
-            <a:extLst>
-              <a:ext uri="{FF2B5EF4-FFF2-40B4-BE49-F238E27FC236}">
-                <a16:creationId xmlns:a16="http://schemas.microsoft.com/office/drawing/2014/main" id="{DDDEC227-68C2-46AC-81A4-368F37020BAA}"/>
-              </a:ext>
-            </a:extLst>
-          </p:cNvPr>
-          <p:cNvSpPr txBox="1"/>
-          <p:nvPr/>
-        </p:nvSpPr>
-        <p:spPr>
-          <a:xfrm>
-            <a:off x="681487" y="6176963"/>
-            <a:ext cx="9057736" cy="738664"/>
-          </a:xfrm>
-          <a:prstGeom prst="rect">
-            <a:avLst/>
-          </a:prstGeom>
-          <a:noFill/>
-        </p:spPr>
-        <p:txBody>
-          <a:bodyPr wrap="square" rtlCol="0">
-            <a:spAutoFit/>
-          </a:bodyPr>
-          <a:lstStyle/>
-          <a:p>
-            <a:r>
-              <a:rPr lang="en-GB" sz="1400" i="1" dirty="0">
-                <a:solidFill>
-                  <a:schemeClr val="bg2"/>
-                </a:solidFill>
-              </a:rPr>
-              <a:t>Note: other covariate coefficients not shown.</a:t>
-            </a:r>
-          </a:p>
-          <a:p>
-            <a:r>
-              <a:rPr lang="en-GB" sz="1400" i="1" u="sng" dirty="0">
-                <a:solidFill>
-                  <a:schemeClr val="bg2"/>
-                </a:solidFill>
-              </a:rPr>
-              <a:t>Base case</a:t>
-            </a:r>
-            <a:r>
-              <a:rPr lang="en-GB" sz="1400" i="1" dirty="0">
-                <a:solidFill>
-                  <a:schemeClr val="bg2"/>
-                </a:solidFill>
-              </a:rPr>
-              <a:t>: non-parent, non-London, male, white, age 25-34, youngest child aged &lt;2yrs, single, no work-limiting health, no children</a:t>
-            </a:r>
-          </a:p>
-        </p:txBody>
-      </p:sp>
-      <p:sp>
-        <p:nvSpPr>
           <p:cNvPr id="11" name="Rectangle 10">
             <a:extLst>
               <a:ext uri="{FF2B5EF4-FFF2-40B4-BE49-F238E27FC236}">
@@ -14081,8 +15961,8 @@
         </p:nvSpPr>
         <p:spPr>
           <a:xfrm>
-            <a:off x="1181819" y="4994694"/>
-            <a:ext cx="3778370" cy="759125"/>
+            <a:off x="1232826" y="4761780"/>
+            <a:ext cx="3398809" cy="759125"/>
           </a:xfrm>
           <a:prstGeom prst="rect">
             <a:avLst/>
@@ -14123,6 +16003,114 @@
     <p:extLst>
       <p:ext uri="{BB962C8B-B14F-4D97-AF65-F5344CB8AC3E}">
         <p14:creationId xmlns:p14="http://schemas.microsoft.com/office/powerpoint/2010/main" val="2431360991"/>
+      </p:ext>
+    </p:extLst>
+  </p:cSld>
+  <p:clrMapOvr>
+    <a:masterClrMapping/>
+  </p:clrMapOvr>
+</p:sld>
+</file>
+
+<file path=ppt/slides/slide9.xml><?xml version="1.0" encoding="utf-8"?>
+<p:sld xmlns:a="http://schemas.openxmlformats.org/drawingml/2006/main" xmlns:r="http://schemas.openxmlformats.org/officeDocument/2006/relationships" xmlns:p="http://schemas.openxmlformats.org/presentationml/2006/main">
+  <p:cSld>
+    <p:spTree>
+      <p:nvGrpSpPr>
+        <p:cNvPr id="1" name=""/>
+        <p:cNvGrpSpPr/>
+        <p:nvPr/>
+      </p:nvGrpSpPr>
+      <p:grpSpPr>
+        <a:xfrm>
+          <a:off x="0" y="0"/>
+          <a:ext cx="0" cy="0"/>
+          <a:chOff x="0" y="0"/>
+          <a:chExt cx="0" cy="0"/>
+        </a:xfrm>
+      </p:grpSpPr>
+      <p:sp>
+        <p:nvSpPr>
+          <p:cNvPr id="2" name="Title 1">
+            <a:extLst>
+              <a:ext uri="{FF2B5EF4-FFF2-40B4-BE49-F238E27FC236}">
+                <a16:creationId xmlns:a16="http://schemas.microsoft.com/office/drawing/2014/main" id="{4C1EA5B5-EAAB-4139-B6AC-4C3DA8D72F6C}"/>
+              </a:ext>
+            </a:extLst>
+          </p:cNvPr>
+          <p:cNvSpPr>
+            <a:spLocks noGrp="1"/>
+          </p:cNvSpPr>
+          <p:nvPr>
+            <p:ph type="title"/>
+          </p:nvPr>
+        </p:nvSpPr>
+        <p:spPr/>
+        <p:txBody>
+          <a:bodyPr/>
+          <a:lstStyle/>
+          <a:p>
+            <a:r>
+              <a:rPr lang="en-GB" dirty="0"/>
+              <a:t>Appendix</a:t>
+            </a:r>
+          </a:p>
+        </p:txBody>
+      </p:sp>
+      <p:sp>
+        <p:nvSpPr>
+          <p:cNvPr id="3" name="Content Placeholder 2">
+            <a:extLst>
+              <a:ext uri="{FF2B5EF4-FFF2-40B4-BE49-F238E27FC236}">
+                <a16:creationId xmlns:a16="http://schemas.microsoft.com/office/drawing/2014/main" id="{3F5EC202-EAF9-4371-956B-E2E0E1EA2451}"/>
+              </a:ext>
+            </a:extLst>
+          </p:cNvPr>
+          <p:cNvSpPr>
+            <a:spLocks noGrp="1"/>
+          </p:cNvSpPr>
+          <p:nvPr>
+            <p:ph sz="half" idx="1"/>
+          </p:nvPr>
+        </p:nvSpPr>
+        <p:spPr/>
+        <p:txBody>
+          <a:bodyPr/>
+          <a:lstStyle/>
+          <a:p>
+            <a:endParaRPr lang="en-GB"/>
+          </a:p>
+        </p:txBody>
+      </p:sp>
+      <p:sp>
+        <p:nvSpPr>
+          <p:cNvPr id="4" name="Content Placeholder 3">
+            <a:extLst>
+              <a:ext uri="{FF2B5EF4-FFF2-40B4-BE49-F238E27FC236}">
+                <a16:creationId xmlns:a16="http://schemas.microsoft.com/office/drawing/2014/main" id="{0B6A4F36-E14E-43A5-A21A-881B4D441D76}"/>
+              </a:ext>
+            </a:extLst>
+          </p:cNvPr>
+          <p:cNvSpPr>
+            <a:spLocks noGrp="1"/>
+          </p:cNvSpPr>
+          <p:nvPr>
+            <p:ph sz="half" idx="2"/>
+          </p:nvPr>
+        </p:nvSpPr>
+        <p:spPr/>
+        <p:txBody>
+          <a:bodyPr/>
+          <a:lstStyle/>
+          <a:p>
+            <a:endParaRPr lang="en-GB"/>
+          </a:p>
+        </p:txBody>
+      </p:sp>
+    </p:spTree>
+    <p:extLst>
+      <p:ext uri="{BB962C8B-B14F-4D97-AF65-F5344CB8AC3E}">
+        <p14:creationId xmlns:p14="http://schemas.microsoft.com/office/powerpoint/2010/main" val="2292651724"/>
       </p:ext>
     </p:extLst>
   </p:cSld>

</xml_diff>

<commit_message>
change definition of child_age var and adjust reg models
</commit_message>
<xml_diff>
--- a/Non-R/Internal slidedeck.pptx
+++ b/Non-R/Internal slidedeck.pptx
@@ -3230,7 +3230,7 @@
                   <a:bodyPr/>
                   <a:lstStyle/>
                   <a:p>
-                    <a:fld id="{BA2F1840-4437-4B80-847F-2EEBFA649A45}" type="CELLRANGE">
+                    <a:fld id="{5E96BE63-C966-4A44-8CFD-897CF5C170D3}" type="CELLRANGE">
                       <a:rPr lang="en-GB"/>
                       <a:pPr/>
                       <a:t>[CELLRANGE]</a:t>
@@ -3454,7 +3454,7 @@
                   <a:bodyPr/>
                   <a:lstStyle/>
                   <a:p>
-                    <a:fld id="{3DEC4141-D2A3-4BA2-B17B-950294888830}" type="CELLRANGE">
+                    <a:fld id="{4EAAACBD-7613-4BFF-81A3-FF389AF97CA0}" type="CELLRANGE">
                       <a:rPr lang="en-GB"/>
                       <a:pPr/>
                       <a:t>[CELLRANGE]</a:t>
@@ -3487,7 +3487,7 @@
                   <a:bodyPr/>
                   <a:lstStyle/>
                   <a:p>
-                    <a:fld id="{40545462-DE1F-4DCE-9671-9A2059A80A82}" type="CELLRANGE">
+                    <a:fld id="{D6E99E6D-0680-4163-8E8E-EE23400EB7A1}" type="CELLRANGE">
                       <a:rPr lang="en-GB"/>
                       <a:pPr/>
                       <a:t>[CELLRANGE]</a:t>
@@ -3520,7 +3520,7 @@
                   <a:bodyPr/>
                   <a:lstStyle/>
                   <a:p>
-                    <a:fld id="{002EE4DA-9395-4EF0-9B85-FDD4D051EA54}" type="CELLRANGE">
+                    <a:fld id="{F0BEF877-9796-468E-ABD8-0C0E473624AA}" type="CELLRANGE">
                       <a:rPr lang="en-GB"/>
                       <a:pPr/>
                       <a:t>[CELLRANGE]</a:t>
@@ -3741,7 +3741,7 @@
                   <a:bodyPr/>
                   <a:lstStyle/>
                   <a:p>
-                    <a:fld id="{ADD6C6AE-6F81-4E39-A73A-28F7C5C3041E}" type="CELLRANGE">
+                    <a:fld id="{6DEBFA2F-C63F-4B1C-8687-AEF4F89DB461}" type="CELLRANGE">
                       <a:rPr lang="en-GB"/>
                       <a:pPr/>
                       <a:t>[CELLRANGE]</a:t>
@@ -3774,7 +3774,7 @@
                   <a:bodyPr/>
                   <a:lstStyle/>
                   <a:p>
-                    <a:fld id="{BA65C899-7277-48AE-B4DA-A9C9334AFC4A}" type="CELLRANGE">
+                    <a:fld id="{788AF0CA-1695-43B9-8045-A5A69601A358}" type="CELLRANGE">
                       <a:rPr lang="en-GB"/>
                       <a:pPr/>
                       <a:t>[CELLRANGE]</a:t>
@@ -3807,7 +3807,7 @@
                   <a:bodyPr/>
                   <a:lstStyle/>
                   <a:p>
-                    <a:fld id="{6174ACAB-2A8C-4963-B51E-9CD2B501BA37}" type="CELLRANGE">
+                    <a:fld id="{865A0456-3F33-4550-83E0-B93F321CF6BA}" type="CELLRANGE">
                       <a:rPr lang="en-GB"/>
                       <a:pPr/>
                       <a:t>[CELLRANGE]</a:t>
@@ -4028,7 +4028,7 @@
                   <a:bodyPr/>
                   <a:lstStyle/>
                   <a:p>
-                    <a:fld id="{72C70B85-616D-46D5-8C27-AD77A1EC9F46}" type="CELLRANGE">
+                    <a:fld id="{11F91D6B-5AFC-497A-B93A-B349F9079E5F}" type="CELLRANGE">
                       <a:rPr lang="en-GB"/>
                       <a:pPr/>
                       <a:t>[CELLRANGE]</a:t>
@@ -4061,7 +4061,7 @@
                   <a:bodyPr/>
                   <a:lstStyle/>
                   <a:p>
-                    <a:fld id="{E63B25E4-DCC5-4483-8619-43DB5922F8C6}" type="CELLRANGE">
+                    <a:fld id="{1C63CC6E-558E-46C2-A986-1D81527F6A13}" type="CELLRANGE">
                       <a:rPr lang="en-GB"/>
                       <a:pPr/>
                       <a:t>[CELLRANGE]</a:t>
@@ -4094,7 +4094,7 @@
                   <a:bodyPr/>
                   <a:lstStyle/>
                   <a:p>
-                    <a:fld id="{3A149E63-28C4-469D-92BC-BC489DB60879}" type="CELLRANGE">
+                    <a:fld id="{D690E3EA-F972-48B6-9C24-52F40E27A2F9}" type="CELLRANGE">
                       <a:rPr lang="en-GB"/>
                       <a:pPr/>
                       <a:t>[CELLRANGE]</a:t>
@@ -4315,7 +4315,7 @@
                   <a:bodyPr/>
                   <a:lstStyle/>
                   <a:p>
-                    <a:fld id="{EE9A7279-82E6-4B79-A699-B9B41FF79DFD}" type="CELLRANGE">
+                    <a:fld id="{F9B8326A-E341-427E-85AD-010E34786AC1}" type="CELLRANGE">
                       <a:rPr lang="en-GB"/>
                       <a:pPr/>
                       <a:t>[CELLRANGE]</a:t>
@@ -4348,7 +4348,7 @@
                   <a:bodyPr/>
                   <a:lstStyle/>
                   <a:p>
-                    <a:fld id="{7048C662-3151-402D-BCBE-1A7EB060CEC0}" type="CELLRANGE">
+                    <a:fld id="{D4B6F09C-CCDB-49C7-AED3-51AA61BCAB62}" type="CELLRANGE">
                       <a:rPr lang="en-GB"/>
                       <a:pPr/>
                       <a:t>[CELLRANGE]</a:t>
@@ -4381,7 +4381,7 @@
                   <a:bodyPr/>
                   <a:lstStyle/>
                   <a:p>
-                    <a:fld id="{D9C1A70F-3EC7-4774-9DF9-19F11F38E761}" type="CELLRANGE">
+                    <a:fld id="{A834C109-1BC8-4369-9116-FD66FB00E57A}" type="CELLRANGE">
                       <a:rPr lang="en-GB"/>
                       <a:pPr/>
                       <a:t>[CELLRANGE]</a:t>
@@ -15414,8 +15414,8 @@
           </a:p>
         </p:txBody>
       </p:sp>
-      <mc:AlternateContent xmlns:mc="http://schemas.openxmlformats.org/markup-compatibility/2006">
-        <mc:Choice xmlns:a14="http://schemas.microsoft.com/office/drawing/2010/main" Requires="a14">
+      <mc:AlternateContent xmlns:mc="http://schemas.openxmlformats.org/markup-compatibility/2006" xmlns:a14="http://schemas.microsoft.com/office/drawing/2010/main">
+        <mc:Choice Requires="a14">
           <p:sp>
             <p:nvSpPr>
               <p:cNvPr id="3" name="Content Placeholder 2">
@@ -15681,7 +15681,7 @@
             </p:txBody>
           </p:sp>
         </mc:Choice>
-        <mc:Fallback>
+        <mc:Fallback xmlns="">
           <p:sp>
             <p:nvSpPr>
               <p:cNvPr id="3" name="Content Placeholder 2">
@@ -15818,6 +15818,41 @@
           </a:p>
         </p:txBody>
       </p:sp>
+      <p:pic>
+        <p:nvPicPr>
+          <p:cNvPr id="6" name="Content Placeholder 5" descr="Diagram&#10;&#10;Description automatically generated">
+            <a:extLst>
+              <a:ext uri="{FF2B5EF4-FFF2-40B4-BE49-F238E27FC236}">
+                <a16:creationId xmlns:a16="http://schemas.microsoft.com/office/drawing/2014/main" id="{81595C2C-09A2-434F-A511-AD05EF875460}"/>
+              </a:ext>
+            </a:extLst>
+          </p:cNvPr>
+          <p:cNvPicPr>
+            <a:picLocks noGrp="1" noChangeAspect="1"/>
+          </p:cNvPicPr>
+          <p:nvPr>
+            <p:ph sz="half" idx="1"/>
+          </p:nvPr>
+        </p:nvPicPr>
+        <p:blipFill>
+          <a:blip r:embed="rId3">
+            <a:extLst>
+              <a:ext uri="{28A0092B-C50C-407E-A947-70E740481C1C}">
+                <a14:useLocalDpi xmlns:a14="http://schemas.microsoft.com/office/drawing/2010/main" val="0"/>
+              </a:ext>
+            </a:extLst>
+          </a:blip>
+          <a:stretch>
+            <a:fillRect/>
+          </a:stretch>
+        </p:blipFill>
+        <p:spPr>
+          <a:xfrm>
+            <a:off x="1253331" y="1825625"/>
+            <a:ext cx="4351338" cy="4351338"/>
+          </a:xfrm>
+        </p:spPr>
+      </p:pic>
       <p:sp>
         <p:nvSpPr>
           <p:cNvPr id="7" name="Content Placeholder 6">
@@ -15837,7 +15872,7 @@
         <p:spPr/>
         <p:txBody>
           <a:bodyPr>
-            <a:normAutofit fontScale="92500" lnSpcReduction="10000"/>
+            <a:normAutofit/>
           </a:bodyPr>
           <a:lstStyle/>
           <a:p>
@@ -15856,16 +15891,6 @@
             <a:r>
               <a:rPr lang="en-GB" dirty="0"/>
               <a:t>Point estimates and 95% CI shown in chart for coefficient of interest</a:t>
-            </a:r>
-          </a:p>
-          <a:p>
-            <a:r>
-              <a:rPr lang="en-GB" dirty="0"/>
-              <a:t>The gap remains in all models except when </a:t>
-            </a:r>
-            <a:r>
-              <a:rPr lang="en-GB" u="sng" dirty="0"/>
-              <a:t>including work-limiting health issues </a:t>
             </a:r>
           </a:p>
           <a:p>
@@ -15912,41 +15937,6 @@
           </a:p>
         </p:txBody>
       </p:sp>
-      <p:pic>
-        <p:nvPicPr>
-          <p:cNvPr id="14" name="Content Placeholder 13" descr="Chart, diagram&#10;&#10;Description automatically generated">
-            <a:extLst>
-              <a:ext uri="{FF2B5EF4-FFF2-40B4-BE49-F238E27FC236}">
-                <a16:creationId xmlns:a16="http://schemas.microsoft.com/office/drawing/2014/main" id="{A4364476-10E1-4AA9-B79D-11FB65D3F604}"/>
-              </a:ext>
-            </a:extLst>
-          </p:cNvPr>
-          <p:cNvPicPr>
-            <a:picLocks noGrp="1" noChangeAspect="1"/>
-          </p:cNvPicPr>
-          <p:nvPr>
-            <p:ph sz="half" idx="1"/>
-          </p:nvPr>
-        </p:nvPicPr>
-        <p:blipFill>
-          <a:blip r:embed="rId3">
-            <a:extLst>
-              <a:ext uri="{28A0092B-C50C-407E-A947-70E740481C1C}">
-                <a14:useLocalDpi xmlns:a14="http://schemas.microsoft.com/office/drawing/2010/main" val="0"/>
-              </a:ext>
-            </a:extLst>
-          </a:blip>
-          <a:stretch>
-            <a:fillRect/>
-          </a:stretch>
-        </p:blipFill>
-        <p:spPr>
-          <a:xfrm>
-            <a:off x="1253331" y="1825625"/>
-            <a:ext cx="4351338" cy="4351338"/>
-          </a:xfrm>
-        </p:spPr>
-      </p:pic>
       <p:sp>
         <p:nvSpPr>
           <p:cNvPr id="11" name="Rectangle 10">

</xml_diff>

<commit_message>
crappy commit as restore i not working
</commit_message>
<xml_diff>
--- a/Non-R/Internal slidedeck.pptx
+++ b/Non-R/Internal slidedeck.pptx
@@ -16698,4 +16698,264 @@
     </a:ext>
   </a:extLst>
 </a:theme>
+</file>
+
+<file path=customXml/item1.xml><?xml version="1.0" encoding="utf-8"?>
+<ct:contentTypeSchema xmlns:ct="http://schemas.microsoft.com/office/2006/metadata/contentType" xmlns:ma="http://schemas.microsoft.com/office/2006/metadata/properties/metaAttributes" ct:_="" ma:_="" ma:contentTypeName="Document" ma:contentTypeID="0x010100535EDF9DD8DBB143AE8CD71BDB6B0E3B" ma:contentTypeVersion="16" ma:contentTypeDescription="Create a new document." ma:contentTypeScope="" ma:versionID="58db4c0cb4a6c8574584e2b7e3b481f7">
+  <xsd:schema xmlns:xsd="http://www.w3.org/2001/XMLSchema" xmlns:xs="http://www.w3.org/2001/XMLSchema" xmlns:p="http://schemas.microsoft.com/office/2006/metadata/properties" xmlns:ns2="7fc9ebc1-6786-4aad-aee1-fdcde6e01ff9" xmlns:ns3="fd7425d0-09b7-49b7-b351-1ad2162dc0d7" targetNamespace="http://schemas.microsoft.com/office/2006/metadata/properties" ma:root="true" ma:fieldsID="7f205f5aa0458c3a5f4d8c0367cd4bd4" ns2:_="" ns3:_="">
+    <xsd:import namespace="7fc9ebc1-6786-4aad-aee1-fdcde6e01ff9"/>
+    <xsd:import namespace="fd7425d0-09b7-49b7-b351-1ad2162dc0d7"/>
+    <xsd:element name="properties">
+      <xsd:complexType>
+        <xsd:sequence>
+          <xsd:element name="documentManagement">
+            <xsd:complexType>
+              <xsd:all>
+                <xsd:element ref="ns2:MediaServiceMetadata" minOccurs="0"/>
+                <xsd:element ref="ns2:MediaServiceFastMetadata" minOccurs="0"/>
+                <xsd:element ref="ns2:MediaServiceAutoKeyPoints" minOccurs="0"/>
+                <xsd:element ref="ns2:MediaServiceKeyPoints" minOccurs="0"/>
+                <xsd:element ref="ns3:SharedWithUsers" minOccurs="0"/>
+                <xsd:element ref="ns3:SharedWithDetails" minOccurs="0"/>
+                <xsd:element ref="ns2:MediaServiceAutoTags" minOccurs="0"/>
+                <xsd:element ref="ns2:MediaServiceOCR" minOccurs="0"/>
+                <xsd:element ref="ns2:MediaServiceGenerationTime" minOccurs="0"/>
+                <xsd:element ref="ns2:MediaServiceEventHashCode" minOccurs="0"/>
+                <xsd:element ref="ns2:MediaServiceDateTaken" minOccurs="0"/>
+                <xsd:element ref="ns2:MediaLengthInSeconds" minOccurs="0"/>
+                <xsd:element ref="ns2:lcf76f155ced4ddcb4097134ff3c332f" minOccurs="0"/>
+                <xsd:element ref="ns3:TaxCatchAll" minOccurs="0"/>
+                <xsd:element ref="ns2:MediaServiceLocation" minOccurs="0"/>
+              </xsd:all>
+            </xsd:complexType>
+          </xsd:element>
+        </xsd:sequence>
+      </xsd:complexType>
+    </xsd:element>
+  </xsd:schema>
+  <xsd:schema xmlns:xsd="http://www.w3.org/2001/XMLSchema" xmlns:xs="http://www.w3.org/2001/XMLSchema" xmlns:dms="http://schemas.microsoft.com/office/2006/documentManagement/types" xmlns:pc="http://schemas.microsoft.com/office/infopath/2007/PartnerControls" targetNamespace="7fc9ebc1-6786-4aad-aee1-fdcde6e01ff9" elementFormDefault="qualified">
+    <xsd:import namespace="http://schemas.microsoft.com/office/2006/documentManagement/types"/>
+    <xsd:import namespace="http://schemas.microsoft.com/office/infopath/2007/PartnerControls"/>
+    <xsd:element name="MediaServiceMetadata" ma:index="8" nillable="true" ma:displayName="MediaServiceMetadata" ma:hidden="true" ma:internalName="MediaServiceMetadata" ma:readOnly="true">
+      <xsd:simpleType>
+        <xsd:restriction base="dms:Note"/>
+      </xsd:simpleType>
+    </xsd:element>
+    <xsd:element name="MediaServiceFastMetadata" ma:index="9" nillable="true" ma:displayName="MediaServiceFastMetadata" ma:hidden="true" ma:internalName="MediaServiceFastMetadata" ma:readOnly="true">
+      <xsd:simpleType>
+        <xsd:restriction base="dms:Note"/>
+      </xsd:simpleType>
+    </xsd:element>
+    <xsd:element name="MediaServiceAutoKeyPoints" ma:index="10" nillable="true" ma:displayName="MediaServiceAutoKeyPoints" ma:hidden="true" ma:internalName="MediaServiceAutoKeyPoints" ma:readOnly="true">
+      <xsd:simpleType>
+        <xsd:restriction base="dms:Note"/>
+      </xsd:simpleType>
+    </xsd:element>
+    <xsd:element name="MediaServiceKeyPoints" ma:index="11" nillable="true" ma:displayName="KeyPoints" ma:internalName="MediaServiceKeyPoints" ma:readOnly="true">
+      <xsd:simpleType>
+        <xsd:restriction base="dms:Note">
+          <xsd:maxLength value="255"/>
+        </xsd:restriction>
+      </xsd:simpleType>
+    </xsd:element>
+    <xsd:element name="MediaServiceAutoTags" ma:index="14" nillable="true" ma:displayName="Tags" ma:internalName="MediaServiceAutoTags" ma:readOnly="true">
+      <xsd:simpleType>
+        <xsd:restriction base="dms:Text"/>
+      </xsd:simpleType>
+    </xsd:element>
+    <xsd:element name="MediaServiceOCR" ma:index="15" nillable="true" ma:displayName="Extracted Text" ma:internalName="MediaServiceOCR" ma:readOnly="true">
+      <xsd:simpleType>
+        <xsd:restriction base="dms:Note">
+          <xsd:maxLength value="255"/>
+        </xsd:restriction>
+      </xsd:simpleType>
+    </xsd:element>
+    <xsd:element name="MediaServiceGenerationTime" ma:index="16" nillable="true" ma:displayName="MediaServiceGenerationTime" ma:hidden="true" ma:internalName="MediaServiceGenerationTime" ma:readOnly="true">
+      <xsd:simpleType>
+        <xsd:restriction base="dms:Text"/>
+      </xsd:simpleType>
+    </xsd:element>
+    <xsd:element name="MediaServiceEventHashCode" ma:index="17" nillable="true" ma:displayName="MediaServiceEventHashCode" ma:hidden="true" ma:internalName="MediaServiceEventHashCode" ma:readOnly="true">
+      <xsd:simpleType>
+        <xsd:restriction base="dms:Text"/>
+      </xsd:simpleType>
+    </xsd:element>
+    <xsd:element name="MediaServiceDateTaken" ma:index="18" nillable="true" ma:displayName="MediaServiceDateTaken" ma:hidden="true" ma:internalName="MediaServiceDateTaken" ma:readOnly="true">
+      <xsd:simpleType>
+        <xsd:restriction base="dms:Text"/>
+      </xsd:simpleType>
+    </xsd:element>
+    <xsd:element name="MediaLengthInSeconds" ma:index="19" nillable="true" ma:displayName="Length (seconds)" ma:internalName="MediaLengthInSeconds" ma:readOnly="true">
+      <xsd:simpleType>
+        <xsd:restriction base="dms:Unknown"/>
+      </xsd:simpleType>
+    </xsd:element>
+    <xsd:element name="lcf76f155ced4ddcb4097134ff3c332f" ma:index="21" nillable="true" ma:taxonomy="true" ma:internalName="lcf76f155ced4ddcb4097134ff3c332f" ma:taxonomyFieldName="MediaServiceImageTags" ma:displayName="Image Tags" ma:readOnly="false" ma:fieldId="{5cf76f15-5ced-4ddc-b409-7134ff3c332f}" ma:taxonomyMulti="true" ma:sspId="5651981c-07c9-48be-a366-aa18a08a6388" ma:termSetId="09814cd3-568e-fe90-9814-8d621ff8fb84" ma:anchorId="fba54fb3-c3e1-fe81-a776-ca4b69148c4d" ma:open="true" ma:isKeyword="false">
+      <xsd:complexType>
+        <xsd:sequence>
+          <xsd:element ref="pc:Terms" minOccurs="0" maxOccurs="1"/>
+        </xsd:sequence>
+      </xsd:complexType>
+    </xsd:element>
+    <xsd:element name="MediaServiceLocation" ma:index="23" nillable="true" ma:displayName="Location" ma:description="" ma:indexed="true" ma:internalName="MediaServiceLocation" ma:readOnly="true">
+      <xsd:simpleType>
+        <xsd:restriction base="dms:Text"/>
+      </xsd:simpleType>
+    </xsd:element>
+  </xsd:schema>
+  <xsd:schema xmlns:xsd="http://www.w3.org/2001/XMLSchema" xmlns:xs="http://www.w3.org/2001/XMLSchema" xmlns:dms="http://schemas.microsoft.com/office/2006/documentManagement/types" xmlns:pc="http://schemas.microsoft.com/office/infopath/2007/PartnerControls" targetNamespace="fd7425d0-09b7-49b7-b351-1ad2162dc0d7" elementFormDefault="qualified">
+    <xsd:import namespace="http://schemas.microsoft.com/office/2006/documentManagement/types"/>
+    <xsd:import namespace="http://schemas.microsoft.com/office/infopath/2007/PartnerControls"/>
+    <xsd:element name="SharedWithUsers" ma:index="12" nillable="true" ma:displayName="Shared With" ma:internalName="SharedWithUsers" ma:readOnly="true">
+      <xsd:complexType>
+        <xsd:complexContent>
+          <xsd:extension base="dms:UserMulti">
+            <xsd:sequence>
+              <xsd:element name="UserInfo" minOccurs="0" maxOccurs="unbounded">
+                <xsd:complexType>
+                  <xsd:sequence>
+                    <xsd:element name="DisplayName" type="xsd:string" minOccurs="0"/>
+                    <xsd:element name="AccountId" type="dms:UserId" minOccurs="0" nillable="true"/>
+                    <xsd:element name="AccountType" type="xsd:string" minOccurs="0"/>
+                  </xsd:sequence>
+                </xsd:complexType>
+              </xsd:element>
+            </xsd:sequence>
+          </xsd:extension>
+        </xsd:complexContent>
+      </xsd:complexType>
+    </xsd:element>
+    <xsd:element name="SharedWithDetails" ma:index="13" nillable="true" ma:displayName="Shared With Details" ma:internalName="SharedWithDetails" ma:readOnly="true">
+      <xsd:simpleType>
+        <xsd:restriction base="dms:Note">
+          <xsd:maxLength value="255"/>
+        </xsd:restriction>
+      </xsd:simpleType>
+    </xsd:element>
+    <xsd:element name="TaxCatchAll" ma:index="22" nillable="true" ma:displayName="Taxonomy Catch All Column" ma:hidden="true" ma:list="{20544d0c-2e96-4949-8e6e-e90d9b14e1b3}" ma:internalName="TaxCatchAll" ma:showField="CatchAllData" ma:web="fd7425d0-09b7-49b7-b351-1ad2162dc0d7">
+      <xsd:complexType>
+        <xsd:complexContent>
+          <xsd:extension base="dms:MultiChoiceLookup">
+            <xsd:sequence>
+              <xsd:element name="Value" type="dms:Lookup" maxOccurs="unbounded" minOccurs="0" nillable="true"/>
+            </xsd:sequence>
+          </xsd:extension>
+        </xsd:complexContent>
+      </xsd:complexType>
+    </xsd:element>
+  </xsd:schema>
+  <xsd:schema xmlns="http://schemas.openxmlformats.org/package/2006/metadata/core-properties" xmlns:xsd="http://www.w3.org/2001/XMLSchema" xmlns:xsi="http://www.w3.org/2001/XMLSchema-instance" xmlns:dc="http://purl.org/dc/elements/1.1/" xmlns:dcterms="http://purl.org/dc/terms/" xmlns:odoc="http://schemas.microsoft.com/internal/obd" targetNamespace="http://schemas.openxmlformats.org/package/2006/metadata/core-properties" elementFormDefault="qualified" attributeFormDefault="unqualified" blockDefault="#all">
+    <xsd:import namespace="http://purl.org/dc/elements/1.1/" schemaLocation="http://dublincore.org/schemas/xmls/qdc/2003/04/02/dc.xsd"/>
+    <xsd:import namespace="http://purl.org/dc/terms/" schemaLocation="http://dublincore.org/schemas/xmls/qdc/2003/04/02/dcterms.xsd"/>
+    <xsd:element name="coreProperties" type="CT_coreProperties"/>
+    <xsd:complexType name="CT_coreProperties">
+      <xsd:all>
+        <xsd:element ref="dc:creator" minOccurs="0" maxOccurs="1"/>
+        <xsd:element ref="dcterms:created" minOccurs="0" maxOccurs="1"/>
+        <xsd:element ref="dc:identifier" minOccurs="0" maxOccurs="1"/>
+        <xsd:element name="contentType" minOccurs="0" maxOccurs="1" type="xsd:string" ma:index="0" ma:displayName="Content Type"/>
+        <xsd:element ref="dc:title" minOccurs="0" maxOccurs="1" ma:index="4" ma:displayName="Title"/>
+        <xsd:element ref="dc:subject" minOccurs="0" maxOccurs="1"/>
+        <xsd:element ref="dc:description" minOccurs="0" maxOccurs="1"/>
+        <xsd:element name="keywords" minOccurs="0" maxOccurs="1" type="xsd:string"/>
+        <xsd:element ref="dc:language" minOccurs="0" maxOccurs="1"/>
+        <xsd:element name="category" minOccurs="0" maxOccurs="1" type="xsd:string"/>
+        <xsd:element name="version" minOccurs="0" maxOccurs="1" type="xsd:string"/>
+        <xsd:element name="revision" minOccurs="0" maxOccurs="1" type="xsd:string">
+          <xsd:annotation>
+            <xsd:documentation>
+                        This value indicates the number of saves or revisions. The application is responsible for updating this value after each revision.
+                    </xsd:documentation>
+          </xsd:annotation>
+        </xsd:element>
+        <xsd:element name="lastModifiedBy" minOccurs="0" maxOccurs="1" type="xsd:string"/>
+        <xsd:element ref="dcterms:modified" minOccurs="0" maxOccurs="1"/>
+        <xsd:element name="contentStatus" minOccurs="0" maxOccurs="1" type="xsd:string"/>
+      </xsd:all>
+    </xsd:complexType>
+  </xsd:schema>
+  <xs:schema xmlns:pc="http://schemas.microsoft.com/office/infopath/2007/PartnerControls" xmlns:xs="http://www.w3.org/2001/XMLSchema" targetNamespace="http://schemas.microsoft.com/office/infopath/2007/PartnerControls" elementFormDefault="qualified" attributeFormDefault="unqualified">
+    <xs:element name="Person">
+      <xs:complexType>
+        <xs:sequence>
+          <xs:element ref="pc:DisplayName" minOccurs="0"/>
+          <xs:element ref="pc:AccountId" minOccurs="0"/>
+          <xs:element ref="pc:AccountType" minOccurs="0"/>
+        </xs:sequence>
+      </xs:complexType>
+    </xs:element>
+    <xs:element name="DisplayName" type="xs:string"/>
+    <xs:element name="AccountId" type="xs:string"/>
+    <xs:element name="AccountType" type="xs:string"/>
+    <xs:element name="BDCAssociatedEntity">
+      <xs:complexType>
+        <xs:sequence>
+          <xs:element ref="pc:BDCEntity" minOccurs="0" maxOccurs="unbounded"/>
+        </xs:sequence>
+        <xs:attribute ref="pc:EntityNamespace"/>
+        <xs:attribute ref="pc:EntityName"/>
+        <xs:attribute ref="pc:SystemInstanceName"/>
+        <xs:attribute ref="pc:AssociationName"/>
+      </xs:complexType>
+    </xs:element>
+    <xs:attribute name="EntityNamespace" type="xs:string"/>
+    <xs:attribute name="EntityName" type="xs:string"/>
+    <xs:attribute name="SystemInstanceName" type="xs:string"/>
+    <xs:attribute name="AssociationName" type="xs:string"/>
+    <xs:element name="BDCEntity">
+      <xs:complexType>
+        <xs:sequence>
+          <xs:element ref="pc:EntityDisplayName" minOccurs="0"/>
+          <xs:element ref="pc:EntityInstanceReference" minOccurs="0"/>
+          <xs:element ref="pc:EntityId1" minOccurs="0"/>
+          <xs:element ref="pc:EntityId2" minOccurs="0"/>
+          <xs:element ref="pc:EntityId3" minOccurs="0"/>
+          <xs:element ref="pc:EntityId4" minOccurs="0"/>
+          <xs:element ref="pc:EntityId5" minOccurs="0"/>
+        </xs:sequence>
+      </xs:complexType>
+    </xs:element>
+    <xs:element name="EntityDisplayName" type="xs:string"/>
+    <xs:element name="EntityInstanceReference" type="xs:string"/>
+    <xs:element name="EntityId1" type="xs:string"/>
+    <xs:element name="EntityId2" type="xs:string"/>
+    <xs:element name="EntityId3" type="xs:string"/>
+    <xs:element name="EntityId4" type="xs:string"/>
+    <xs:element name="EntityId5" type="xs:string"/>
+    <xs:element name="Terms">
+      <xs:complexType>
+        <xs:sequence>
+          <xs:element ref="pc:TermInfo" minOccurs="0" maxOccurs="unbounded"/>
+        </xs:sequence>
+      </xs:complexType>
+    </xs:element>
+    <xs:element name="TermInfo">
+      <xs:complexType>
+        <xs:sequence>
+          <xs:element ref="pc:TermName" minOccurs="0"/>
+          <xs:element ref="pc:TermId" minOccurs="0"/>
+        </xs:sequence>
+      </xs:complexType>
+    </xs:element>
+    <xs:element name="TermName" type="xs:string"/>
+    <xs:element name="TermId" type="xs:string"/>
+  </xs:schema>
+</ct:contentTypeSchema>
+</file>
+
+<file path=customXml/item2.xml><?xml version="1.0" encoding="utf-8"?>
+<?mso-contentType ?>
+<FormTemplates xmlns="http://schemas.microsoft.com/sharepoint/v3/contenttype/forms">
+  <Display>DocumentLibraryForm</Display>
+  <Edit>DocumentLibraryForm</Edit>
+  <New>DocumentLibraryForm</New>
+</FormTemplates>
+</file>
+
+<file path=customXml/itemProps1.xml><?xml version="1.0" encoding="utf-8"?>
+<ds:datastoreItem xmlns:ds="http://schemas.openxmlformats.org/officeDocument/2006/customXml" ds:itemID="{446574AB-2E71-4B36-8956-19443FEB8C02}"/>
+</file>
+
+<file path=customXml/itemProps2.xml><?xml version="1.0" encoding="utf-8"?>
+<ds:datastoreItem xmlns:ds="http://schemas.openxmlformats.org/officeDocument/2006/customXml" ds:itemID="{E877200C-0126-4212-8D61-634C50D1750F}"/>
 </file>
</xml_diff>